<commit_message>
Presentation and docx sent
</commit_message>
<xml_diff>
--- a/SPORTEVE – A WEB APPLICATION FOR ORGANIZING SPORTING.pptx
+++ b/SPORTEVE – A WEB APPLICATION FOR ORGANIZING SPORTING.pptx
@@ -6,20 +6,23 @@
   </p:sldMasterIdLst>
   <p:sldIdLst>
     <p:sldId id="256" r:id="rId2"/>
-    <p:sldId id="257" r:id="rId3"/>
-    <p:sldId id="258" r:id="rId4"/>
-    <p:sldId id="259" r:id="rId5"/>
-    <p:sldId id="260" r:id="rId6"/>
-    <p:sldId id="261" r:id="rId7"/>
-    <p:sldId id="262" r:id="rId8"/>
-    <p:sldId id="263" r:id="rId9"/>
-    <p:sldId id="264" r:id="rId10"/>
-    <p:sldId id="265" r:id="rId11"/>
-    <p:sldId id="267" r:id="rId12"/>
-    <p:sldId id="266" r:id="rId13"/>
-    <p:sldId id="268" r:id="rId14"/>
-    <p:sldId id="269" r:id="rId15"/>
-    <p:sldId id="270" r:id="rId16"/>
+    <p:sldId id="273" r:id="rId3"/>
+    <p:sldId id="272" r:id="rId4"/>
+    <p:sldId id="271" r:id="rId5"/>
+    <p:sldId id="257" r:id="rId6"/>
+    <p:sldId id="258" r:id="rId7"/>
+    <p:sldId id="259" r:id="rId8"/>
+    <p:sldId id="260" r:id="rId9"/>
+    <p:sldId id="261" r:id="rId10"/>
+    <p:sldId id="262" r:id="rId11"/>
+    <p:sldId id="263" r:id="rId12"/>
+    <p:sldId id="264" r:id="rId13"/>
+    <p:sldId id="265" r:id="rId14"/>
+    <p:sldId id="267" r:id="rId15"/>
+    <p:sldId id="266" r:id="rId16"/>
+    <p:sldId id="268" r:id="rId17"/>
+    <p:sldId id="269" r:id="rId18"/>
+    <p:sldId id="270" r:id="rId19"/>
   </p:sldIdLst>
   <p:sldSz cx="12192000" cy="6858000"/>
   <p:notesSz cx="6858000" cy="9144000"/>
@@ -413,7 +416,7 @@
           <a:p>
             <a:fld id="{38F86381-3ACB-4FC8-866C-DAD5DF65C4C8}" type="datetimeFigureOut">
               <a:rPr lang="hr-HR" smtClean="0"/>
-              <a:t>26.6.2022.</a:t>
+              <a:t>27.6.2022.</a:t>
             </a:fld>
             <a:endParaRPr lang="hr-HR"/>
           </a:p>
@@ -731,7 +734,7 @@
           <a:p>
             <a:fld id="{38F86381-3ACB-4FC8-866C-DAD5DF65C4C8}" type="datetimeFigureOut">
               <a:rPr lang="hr-HR" smtClean="0"/>
-              <a:t>26.6.2022.</a:t>
+              <a:t>27.6.2022.</a:t>
             </a:fld>
             <a:endParaRPr lang="hr-HR"/>
           </a:p>
@@ -1219,7 +1222,7 @@
           <a:p>
             <a:fld id="{38F86381-3ACB-4FC8-866C-DAD5DF65C4C8}" type="datetimeFigureOut">
               <a:rPr lang="hr-HR" smtClean="0"/>
-              <a:t>26.6.2022.</a:t>
+              <a:t>27.6.2022.</a:t>
             </a:fld>
             <a:endParaRPr lang="hr-HR"/>
           </a:p>
@@ -1588,7 +1591,7 @@
           <a:p>
             <a:fld id="{38F86381-3ACB-4FC8-866C-DAD5DF65C4C8}" type="datetimeFigureOut">
               <a:rPr lang="hr-HR" smtClean="0"/>
-              <a:t>26.6.2022.</a:t>
+              <a:t>27.6.2022.</a:t>
             </a:fld>
             <a:endParaRPr lang="hr-HR"/>
           </a:p>
@@ -1861,7 +1864,7 @@
           <a:p>
             <a:fld id="{38F86381-3ACB-4FC8-866C-DAD5DF65C4C8}" type="datetimeFigureOut">
               <a:rPr lang="hr-HR" smtClean="0"/>
-              <a:t>26.6.2022.</a:t>
+              <a:t>27.6.2022.</a:t>
             </a:fld>
             <a:endParaRPr lang="hr-HR"/>
           </a:p>
@@ -2146,7 +2149,7 @@
           <a:p>
             <a:fld id="{38F86381-3ACB-4FC8-866C-DAD5DF65C4C8}" type="datetimeFigureOut">
               <a:rPr lang="hr-HR" smtClean="0"/>
-              <a:t>26.6.2022.</a:t>
+              <a:t>27.6.2022.</a:t>
             </a:fld>
             <a:endParaRPr lang="hr-HR"/>
           </a:p>
@@ -2429,7 +2432,7 @@
           <a:p>
             <a:fld id="{38F86381-3ACB-4FC8-866C-DAD5DF65C4C8}" type="datetimeFigureOut">
               <a:rPr lang="hr-HR" smtClean="0"/>
-              <a:t>26.6.2022.</a:t>
+              <a:t>27.6.2022.</a:t>
             </a:fld>
             <a:endParaRPr lang="hr-HR"/>
           </a:p>
@@ -2772,7 +2775,7 @@
           <a:p>
             <a:fld id="{38F86381-3ACB-4FC8-866C-DAD5DF65C4C8}" type="datetimeFigureOut">
               <a:rPr lang="hr-HR" smtClean="0"/>
-              <a:t>26.6.2022.</a:t>
+              <a:t>27.6.2022.</a:t>
             </a:fld>
             <a:endParaRPr lang="hr-HR"/>
           </a:p>
@@ -3111,7 +3114,7 @@
           <a:p>
             <a:fld id="{38F86381-3ACB-4FC8-866C-DAD5DF65C4C8}" type="datetimeFigureOut">
               <a:rPr lang="hr-HR" smtClean="0"/>
-              <a:t>26.6.2022.</a:t>
+              <a:t>27.6.2022.</a:t>
             </a:fld>
             <a:endParaRPr lang="hr-HR"/>
           </a:p>
@@ -3588,7 +3591,7 @@
           <a:p>
             <a:fld id="{38F86381-3ACB-4FC8-866C-DAD5DF65C4C8}" type="datetimeFigureOut">
               <a:rPr lang="hr-HR" smtClean="0"/>
-              <a:t>26.6.2022.</a:t>
+              <a:t>27.6.2022.</a:t>
             </a:fld>
             <a:endParaRPr lang="hr-HR"/>
           </a:p>
@@ -3809,7 +3812,7 @@
           <a:p>
             <a:fld id="{38F86381-3ACB-4FC8-866C-DAD5DF65C4C8}" type="datetimeFigureOut">
               <a:rPr lang="hr-HR" smtClean="0"/>
-              <a:t>26.6.2022.</a:t>
+              <a:t>27.6.2022.</a:t>
             </a:fld>
             <a:endParaRPr lang="hr-HR"/>
           </a:p>
@@ -3904,7 +3907,7 @@
           <a:p>
             <a:fld id="{38F86381-3ACB-4FC8-866C-DAD5DF65C4C8}" type="datetimeFigureOut">
               <a:rPr lang="hr-HR" smtClean="0"/>
-              <a:t>26.6.2022.</a:t>
+              <a:t>27.6.2022.</a:t>
             </a:fld>
             <a:endParaRPr lang="hr-HR"/>
           </a:p>
@@ -4371,7 +4374,7 @@
           <a:p>
             <a:fld id="{38F86381-3ACB-4FC8-866C-DAD5DF65C4C8}" type="datetimeFigureOut">
               <a:rPr lang="hr-HR" smtClean="0"/>
-              <a:t>26.6.2022.</a:t>
+              <a:t>27.6.2022.</a:t>
             </a:fld>
             <a:endParaRPr lang="hr-HR"/>
           </a:p>
@@ -4684,7 +4687,7 @@
           <a:p>
             <a:fld id="{38F86381-3ACB-4FC8-866C-DAD5DF65C4C8}" type="datetimeFigureOut">
               <a:rPr lang="hr-HR" smtClean="0"/>
-              <a:t>26.6.2022.</a:t>
+              <a:t>27.6.2022.</a:t>
             </a:fld>
             <a:endParaRPr lang="hr-HR"/>
           </a:p>
@@ -4954,7 +4957,7 @@
           <a:p>
             <a:fld id="{38F86381-3ACB-4FC8-866C-DAD5DF65C4C8}" type="datetimeFigureOut">
               <a:rPr lang="hr-HR" smtClean="0"/>
-              <a:t>26.6.2022.</a:t>
+              <a:t>27.6.2022.</a:t>
             </a:fld>
             <a:endParaRPr lang="hr-HR"/>
           </a:p>
@@ -5489,12 +5492,8 @@
           <a:p>
             <a:pPr algn="r"/>
             <a:r>
-              <a:rPr lang="en-US" sz="1600" dirty="0" err="1"/>
-              <a:t>Menthor</a:t>
-            </a:r>
-            <a:r>
               <a:rPr lang="en-US" sz="1600" dirty="0"/>
-              <a:t>: Doc. Dr. Sc. Marina Bagić Babac</a:t>
+              <a:t>Mentor: Doc. Dr. Sc. Marina Bagić Babac</a:t>
             </a:r>
           </a:p>
           <a:p>
@@ -5521,6 +5520,1313 @@
 </file>
 
 <file path=ppt/slides/slide10.xml><?xml version="1.0" encoding="utf-8"?>
+<p:sld xmlns:a="http://schemas.openxmlformats.org/drawingml/2006/main" xmlns:r="http://schemas.openxmlformats.org/officeDocument/2006/relationships" xmlns:p="http://schemas.openxmlformats.org/presentationml/2006/main">
+  <p:cSld>
+    <p:bg>
+      <p:bgPr>
+        <a:solidFill>
+          <a:schemeClr val="bg1"/>
+        </a:solidFill>
+        <a:effectLst/>
+      </p:bgPr>
+    </p:bg>
+    <p:spTree>
+      <p:nvGrpSpPr>
+        <p:cNvPr id="1" name=""/>
+        <p:cNvGrpSpPr/>
+        <p:nvPr/>
+      </p:nvGrpSpPr>
+      <p:grpSpPr>
+        <a:xfrm>
+          <a:off x="0" y="0"/>
+          <a:ext cx="0" cy="0"/>
+          <a:chOff x="0" y="0"/>
+          <a:chExt cx="0" cy="0"/>
+        </a:xfrm>
+      </p:grpSpPr>
+      <p:sp>
+        <p:nvSpPr>
+          <p:cNvPr id="21" name="Freeform 6">
+            <a:extLst>
+              <a:ext uri="{FF2B5EF4-FFF2-40B4-BE49-F238E27FC236}">
+                <a16:creationId xmlns:a16="http://schemas.microsoft.com/office/drawing/2014/main" id="{133F8CB7-795C-4272-9073-64D8CF97F220}"/>
+              </a:ext>
+              <a:ext uri="{C183D7F6-B498-43B3-948B-1728B52AA6E4}">
+                <adec:decorative xmlns:adec="http://schemas.microsoft.com/office/drawing/2017/decorative" val="1"/>
+              </a:ext>
+            </a:extLst>
+          </p:cNvPr>
+          <p:cNvSpPr>
+            <a:spLocks noGrp="1" noRot="1" noChangeAspect="1" noMove="1" noResize="1" noEditPoints="1" noAdjustHandles="1" noChangeArrowheads="1" noChangeShapeType="1" noTextEdit="1"/>
+          </p:cNvSpPr>
+          <p:nvPr>
+            <p:extLst>
+              <p:ext uri="{386F3935-93C4-4BCD-93E2-E3B085C9AB24}">
+                <p16:designElem xmlns:p16="http://schemas.microsoft.com/office/powerpoint/2015/main" val="1"/>
+              </p:ext>
+            </p:extLst>
+          </p:nvPr>
+        </p:nvSpPr>
+        <p:spPr bwMode="auto">
+          <a:xfrm>
+            <a:off x="0" y="-3175"/>
+            <a:ext cx="12192000" cy="5203825"/>
+          </a:xfrm>
+          <a:custGeom>
+            <a:avLst/>
+            <a:gdLst/>
+            <a:ahLst/>
+            <a:cxnLst/>
+            <a:rect l="0" t="0" r="r" b="b"/>
+            <a:pathLst>
+              <a:path w="5760" h="3278">
+                <a:moveTo>
+                  <a:pt x="5760" y="0"/>
+                </a:moveTo>
+                <a:lnTo>
+                  <a:pt x="0" y="0"/>
+                </a:lnTo>
+                <a:lnTo>
+                  <a:pt x="0" y="3090"/>
+                </a:lnTo>
+                <a:lnTo>
+                  <a:pt x="943" y="3090"/>
+                </a:lnTo>
+                <a:lnTo>
+                  <a:pt x="1123" y="3270"/>
+                </a:lnTo>
+                <a:lnTo>
+                  <a:pt x="1123" y="3270"/>
+                </a:lnTo>
+                <a:lnTo>
+                  <a:pt x="1127" y="3272"/>
+                </a:lnTo>
+                <a:lnTo>
+                  <a:pt x="1133" y="3275"/>
+                </a:lnTo>
+                <a:lnTo>
+                  <a:pt x="1139" y="3278"/>
+                </a:lnTo>
+                <a:lnTo>
+                  <a:pt x="1144" y="3278"/>
+                </a:lnTo>
+                <a:lnTo>
+                  <a:pt x="1150" y="3278"/>
+                </a:lnTo>
+                <a:lnTo>
+                  <a:pt x="1155" y="3275"/>
+                </a:lnTo>
+                <a:lnTo>
+                  <a:pt x="1161" y="3272"/>
+                </a:lnTo>
+                <a:lnTo>
+                  <a:pt x="1165" y="3270"/>
+                </a:lnTo>
+                <a:lnTo>
+                  <a:pt x="1345" y="3090"/>
+                </a:lnTo>
+                <a:lnTo>
+                  <a:pt x="5760" y="3090"/>
+                </a:lnTo>
+                <a:lnTo>
+                  <a:pt x="5760" y="0"/>
+                </a:lnTo>
+                <a:close/>
+              </a:path>
+            </a:pathLst>
+          </a:custGeom>
+          <a:ln/>
+          <a:effectLst/>
+          <a:extLst>
+            <a:ext uri="{91240B29-F687-4f45-9708-019B960494DF}">
+              <a14:hiddenLine xmlns:a14="http://schemas.microsoft.com/office/drawing/2010/main" xmlns:p14="http://schemas.microsoft.com/office/powerpoint/2010/main" xmlns:a16="http://schemas.microsoft.com/office/drawing/2014/main" xmlns="" w="9525">
+                <a:solidFill>
+                  <a:srgbClr val="000000"/>
+                </a:solidFill>
+                <a:round/>
+                <a:headEnd/>
+                <a:tailEnd/>
+              </a14:hiddenLine>
+            </a:ext>
+          </a:extLst>
+        </p:spPr>
+        <p:style>
+          <a:lnRef idx="1">
+            <a:schemeClr val="accent1"/>
+          </a:lnRef>
+          <a:fillRef idx="3">
+            <a:schemeClr val="accent1"/>
+          </a:fillRef>
+          <a:effectRef idx="2">
+            <a:schemeClr val="accent1"/>
+          </a:effectRef>
+          <a:fontRef idx="minor">
+            <a:schemeClr val="lt1"/>
+          </a:fontRef>
+        </p:style>
+      </p:sp>
+      <p:sp>
+        <p:nvSpPr>
+          <p:cNvPr id="23" name="Rectangle 22">
+            <a:extLst>
+              <a:ext uri="{FF2B5EF4-FFF2-40B4-BE49-F238E27FC236}">
+                <a16:creationId xmlns:a16="http://schemas.microsoft.com/office/drawing/2014/main" id="{B7743172-17A8-4FA4-8434-B813E03B7665}"/>
+              </a:ext>
+              <a:ext uri="{C183D7F6-B498-43B3-948B-1728B52AA6E4}">
+                <adec:decorative xmlns:adec="http://schemas.microsoft.com/office/drawing/2017/decorative" val="1"/>
+              </a:ext>
+            </a:extLst>
+          </p:cNvPr>
+          <p:cNvSpPr>
+            <a:spLocks noGrp="1" noRot="1" noChangeAspect="1" noMove="1" noResize="1" noEditPoints="1" noAdjustHandles="1" noChangeArrowheads="1" noChangeShapeType="1" noTextEdit="1"/>
+          </p:cNvSpPr>
+          <p:nvPr>
+            <p:extLst>
+              <p:ext uri="{386F3935-93C4-4BCD-93E2-E3B085C9AB24}">
+                <p16:designElem xmlns:p16="http://schemas.microsoft.com/office/powerpoint/2015/main" val="1"/>
+              </p:ext>
+            </p:extLst>
+          </p:nvPr>
+        </p:nvSpPr>
+        <p:spPr>
+          <a:xfrm>
+            <a:off x="0" y="0"/>
+            <a:ext cx="12192000" cy="6858000"/>
+          </a:xfrm>
+          <a:prstGeom prst="rect">
+            <a:avLst/>
+          </a:prstGeom>
+          <a:solidFill>
+            <a:schemeClr val="bg1"/>
+          </a:solidFill>
+          <a:ln>
+            <a:noFill/>
+          </a:ln>
+        </p:spPr>
+        <p:style>
+          <a:lnRef idx="2">
+            <a:schemeClr val="accent1">
+              <a:shade val="50000"/>
+            </a:schemeClr>
+          </a:lnRef>
+          <a:fillRef idx="1">
+            <a:schemeClr val="accent1"/>
+          </a:fillRef>
+          <a:effectRef idx="0">
+            <a:schemeClr val="accent1"/>
+          </a:effectRef>
+          <a:fontRef idx="minor">
+            <a:schemeClr val="lt1"/>
+          </a:fontRef>
+        </p:style>
+        <p:txBody>
+          <a:bodyPr rtlCol="0" anchor="ctr"/>
+          <a:lstStyle/>
+          <a:p>
+            <a:pPr algn="ctr"/>
+            <a:endParaRPr lang="en-US"/>
+          </a:p>
+        </p:txBody>
+      </p:sp>
+      <p:sp>
+        <p:nvSpPr>
+          <p:cNvPr id="25" name="Freeform 23">
+            <a:extLst>
+              <a:ext uri="{FF2B5EF4-FFF2-40B4-BE49-F238E27FC236}">
+                <a16:creationId xmlns:a16="http://schemas.microsoft.com/office/drawing/2014/main" id="{4CE1233C-FD2F-489E-BFDE-086F5FED6491}"/>
+              </a:ext>
+              <a:ext uri="{C183D7F6-B498-43B3-948B-1728B52AA6E4}">
+                <adec:decorative xmlns:adec="http://schemas.microsoft.com/office/drawing/2017/decorative" val="1"/>
+              </a:ext>
+            </a:extLst>
+          </p:cNvPr>
+          <p:cNvSpPr>
+            <a:spLocks noGrp="1" noRot="1" noChangeAspect="1" noMove="1" noResize="1" noEditPoints="1" noAdjustHandles="1" noChangeArrowheads="1" noChangeShapeType="1" noTextEdit="1"/>
+          </p:cNvSpPr>
+          <p:nvPr>
+            <p:extLst>
+              <p:ext uri="{386F3935-93C4-4BCD-93E2-E3B085C9AB24}">
+                <p16:designElem xmlns:p16="http://schemas.microsoft.com/office/powerpoint/2015/main" val="1"/>
+              </p:ext>
+            </p:extLst>
+          </p:nvPr>
+        </p:nvSpPr>
+        <p:spPr bwMode="white">
+          <a:xfrm>
+            <a:off x="0" y="0"/>
+            <a:ext cx="4637005" cy="6858000"/>
+          </a:xfrm>
+          <a:custGeom>
+            <a:avLst/>
+            <a:gdLst>
+              <a:gd name="connsiteX0" fmla="*/ 0 w 4637005"/>
+              <a:gd name="connsiteY0" fmla="*/ 0 h 6858000"/>
+              <a:gd name="connsiteX1" fmla="*/ 4637005 w 4637005"/>
+              <a:gd name="connsiteY1" fmla="*/ 0 h 6858000"/>
+              <a:gd name="connsiteX2" fmla="*/ 4637005 w 4637005"/>
+              <a:gd name="connsiteY2" fmla="*/ 1900238 h 6858000"/>
+              <a:gd name="connsiteX3" fmla="*/ 4266589 w 4637005"/>
+              <a:gd name="connsiteY3" fmla="*/ 2178050 h 6858000"/>
+              <a:gd name="connsiteX4" fmla="*/ 4262355 w 4637005"/>
+              <a:gd name="connsiteY4" fmla="*/ 2184400 h 6858000"/>
+              <a:gd name="connsiteX5" fmla="*/ 4256005 w 4637005"/>
+              <a:gd name="connsiteY5" fmla="*/ 2193925 h 6858000"/>
+              <a:gd name="connsiteX6" fmla="*/ 4249655 w 4637005"/>
+              <a:gd name="connsiteY6" fmla="*/ 2201863 h 6858000"/>
+              <a:gd name="connsiteX7" fmla="*/ 4249655 w 4637005"/>
+              <a:gd name="connsiteY7" fmla="*/ 2211388 h 6858000"/>
+              <a:gd name="connsiteX8" fmla="*/ 4249655 w 4637005"/>
+              <a:gd name="connsiteY8" fmla="*/ 2220913 h 6858000"/>
+              <a:gd name="connsiteX9" fmla="*/ 4256005 w 4637005"/>
+              <a:gd name="connsiteY9" fmla="*/ 2228850 h 6858000"/>
+              <a:gd name="connsiteX10" fmla="*/ 4262355 w 4637005"/>
+              <a:gd name="connsiteY10" fmla="*/ 2238375 h 6858000"/>
+              <a:gd name="connsiteX11" fmla="*/ 4266589 w 4637005"/>
+              <a:gd name="connsiteY11" fmla="*/ 2244725 h 6858000"/>
+              <a:gd name="connsiteX12" fmla="*/ 4637005 w 4637005"/>
+              <a:gd name="connsiteY12" fmla="*/ 2522538 h 6858000"/>
+              <a:gd name="connsiteX13" fmla="*/ 4637005 w 4637005"/>
+              <a:gd name="connsiteY13" fmla="*/ 6858000 h 6858000"/>
+              <a:gd name="connsiteX14" fmla="*/ 0 w 4637005"/>
+              <a:gd name="connsiteY14" fmla="*/ 6858000 h 6858000"/>
+            </a:gdLst>
+            <a:ahLst/>
+            <a:cxnLst>
+              <a:cxn ang="0">
+                <a:pos x="connsiteX0" y="connsiteY0"/>
+              </a:cxn>
+              <a:cxn ang="0">
+                <a:pos x="connsiteX1" y="connsiteY1"/>
+              </a:cxn>
+              <a:cxn ang="0">
+                <a:pos x="connsiteX2" y="connsiteY2"/>
+              </a:cxn>
+              <a:cxn ang="0">
+                <a:pos x="connsiteX3" y="connsiteY3"/>
+              </a:cxn>
+              <a:cxn ang="0">
+                <a:pos x="connsiteX4" y="connsiteY4"/>
+              </a:cxn>
+              <a:cxn ang="0">
+                <a:pos x="connsiteX5" y="connsiteY5"/>
+              </a:cxn>
+              <a:cxn ang="0">
+                <a:pos x="connsiteX6" y="connsiteY6"/>
+              </a:cxn>
+              <a:cxn ang="0">
+                <a:pos x="connsiteX7" y="connsiteY7"/>
+              </a:cxn>
+              <a:cxn ang="0">
+                <a:pos x="connsiteX8" y="connsiteY8"/>
+              </a:cxn>
+              <a:cxn ang="0">
+                <a:pos x="connsiteX9" y="connsiteY9"/>
+              </a:cxn>
+              <a:cxn ang="0">
+                <a:pos x="connsiteX10" y="connsiteY10"/>
+              </a:cxn>
+              <a:cxn ang="0">
+                <a:pos x="connsiteX11" y="connsiteY11"/>
+              </a:cxn>
+              <a:cxn ang="0">
+                <a:pos x="connsiteX12" y="connsiteY12"/>
+              </a:cxn>
+              <a:cxn ang="0">
+                <a:pos x="connsiteX13" y="connsiteY13"/>
+              </a:cxn>
+              <a:cxn ang="0">
+                <a:pos x="connsiteX14" y="connsiteY14"/>
+              </a:cxn>
+            </a:cxnLst>
+            <a:rect l="l" t="t" r="r" b="b"/>
+            <a:pathLst>
+              <a:path w="4637005" h="6858000">
+                <a:moveTo>
+                  <a:pt x="0" y="0"/>
+                </a:moveTo>
+                <a:lnTo>
+                  <a:pt x="4637005" y="0"/>
+                </a:lnTo>
+                <a:lnTo>
+                  <a:pt x="4637005" y="1900238"/>
+                </a:lnTo>
+                <a:lnTo>
+                  <a:pt x="4266589" y="2178050"/>
+                </a:lnTo>
+                <a:lnTo>
+                  <a:pt x="4262355" y="2184400"/>
+                </a:lnTo>
+                <a:lnTo>
+                  <a:pt x="4256005" y="2193925"/>
+                </a:lnTo>
+                <a:lnTo>
+                  <a:pt x="4249655" y="2201863"/>
+                </a:lnTo>
+                <a:lnTo>
+                  <a:pt x="4249655" y="2211388"/>
+                </a:lnTo>
+                <a:lnTo>
+                  <a:pt x="4249655" y="2220913"/>
+                </a:lnTo>
+                <a:lnTo>
+                  <a:pt x="4256005" y="2228850"/>
+                </a:lnTo>
+                <a:lnTo>
+                  <a:pt x="4262355" y="2238375"/>
+                </a:lnTo>
+                <a:lnTo>
+                  <a:pt x="4266589" y="2244725"/>
+                </a:lnTo>
+                <a:lnTo>
+                  <a:pt x="4637005" y="2522538"/>
+                </a:lnTo>
+                <a:lnTo>
+                  <a:pt x="4637005" y="6858000"/>
+                </a:lnTo>
+                <a:lnTo>
+                  <a:pt x="0" y="6858000"/>
+                </a:lnTo>
+                <a:close/>
+              </a:path>
+            </a:pathLst>
+          </a:custGeom>
+          <a:blipFill>
+            <a:blip r:embed="rId2">
+              <a:duotone>
+                <a:schemeClr val="accent1">
+                  <a:tint val="98000"/>
+                  <a:lumMod val="102000"/>
+                </a:schemeClr>
+                <a:schemeClr val="accent1">
+                  <a:shade val="98000"/>
+                  <a:lumMod val="98000"/>
+                </a:schemeClr>
+              </a:duotone>
+            </a:blip>
+            <a:tile tx="0" ty="0" sx="100000" sy="100000" flip="none" algn="tl"/>
+          </a:blipFill>
+          <a:ln>
+            <a:headEnd/>
+            <a:tailEnd/>
+          </a:ln>
+        </p:spPr>
+        <p:style>
+          <a:lnRef idx="1">
+            <a:schemeClr val="accent1"/>
+          </a:lnRef>
+          <a:fillRef idx="3">
+            <a:schemeClr val="accent1"/>
+          </a:fillRef>
+          <a:effectRef idx="2">
+            <a:schemeClr val="accent1"/>
+          </a:effectRef>
+          <a:fontRef idx="minor">
+            <a:schemeClr val="lt1"/>
+          </a:fontRef>
+        </p:style>
+        <p:txBody>
+          <a:bodyPr wrap="square" rtlCol="0" anchor="ctr">
+            <a:noAutofit/>
+          </a:bodyPr>
+          <a:lstStyle/>
+          <a:p>
+            <a:pPr algn="ctr"/>
+            <a:endParaRPr lang="en-US"/>
+          </a:p>
+        </p:txBody>
+      </p:sp>
+      <p:sp>
+        <p:nvSpPr>
+          <p:cNvPr id="2" name="Naslov 1">
+            <a:extLst>
+              <a:ext uri="{FF2B5EF4-FFF2-40B4-BE49-F238E27FC236}">
+                <a16:creationId xmlns:a16="http://schemas.microsoft.com/office/drawing/2014/main" id="{422AF827-5C06-0CB7-4EF9-32408E8EB392}"/>
+              </a:ext>
+            </a:extLst>
+          </p:cNvPr>
+          <p:cNvSpPr>
+            <a:spLocks noGrp="1"/>
+          </p:cNvSpPr>
+          <p:nvPr>
+            <p:ph type="title"/>
+          </p:nvPr>
+        </p:nvSpPr>
+        <p:spPr>
+          <a:xfrm>
+            <a:off x="451514" y="1800225"/>
+            <a:ext cx="3444211" cy="838200"/>
+          </a:xfrm>
+        </p:spPr>
+        <p:txBody>
+          <a:bodyPr vert="horz" lIns="91440" tIns="45720" rIns="91440" bIns="45720" rtlCol="0" anchor="t">
+            <a:normAutofit/>
+          </a:bodyPr>
+          <a:lstStyle/>
+          <a:p>
+            <a:r>
+              <a:rPr lang="en-US" sz="4400" dirty="0"/>
+              <a:t>Main page</a:t>
+            </a:r>
+          </a:p>
+        </p:txBody>
+      </p:sp>
+      <p:pic>
+        <p:nvPicPr>
+          <p:cNvPr id="5" name="Rezervirano mjesto sadržaja 4">
+            <a:extLst>
+              <a:ext uri="{FF2B5EF4-FFF2-40B4-BE49-F238E27FC236}">
+                <a16:creationId xmlns:a16="http://schemas.microsoft.com/office/drawing/2014/main" id="{3D1B5D4E-6C03-83C3-F7A2-FC54B2379F31}"/>
+              </a:ext>
+            </a:extLst>
+          </p:cNvPr>
+          <p:cNvPicPr>
+            <a:picLocks noGrp="1" noChangeAspect="1"/>
+          </p:cNvPicPr>
+          <p:nvPr>
+            <p:ph idx="1"/>
+          </p:nvPr>
+        </p:nvPicPr>
+        <p:blipFill>
+          <a:blip r:embed="rId3">
+            <a:extLst>
+              <a:ext uri="{28A0092B-C50C-407E-A947-70E740481C1C}">
+                <a14:useLocalDpi xmlns:a14="http://schemas.microsoft.com/office/drawing/2010/main" val="0"/>
+              </a:ext>
+            </a:extLst>
+          </a:blip>
+          <a:stretch>
+            <a:fillRect/>
+          </a:stretch>
+        </p:blipFill>
+        <p:spPr>
+          <a:xfrm>
+            <a:off x="5280472" y="1430655"/>
+            <a:ext cx="6268062" cy="3823517"/>
+          </a:xfrm>
+          <a:prstGeom prst="roundRect">
+            <a:avLst>
+              <a:gd name="adj" fmla="val 3876"/>
+            </a:avLst>
+          </a:prstGeom>
+          <a:ln>
+            <a:solidFill>
+              <a:schemeClr val="accent1"/>
+            </a:solidFill>
+          </a:ln>
+          <a:effectLst/>
+        </p:spPr>
+      </p:pic>
+      <p:sp>
+        <p:nvSpPr>
+          <p:cNvPr id="3" name="TekstniOkvir 2">
+            <a:extLst>
+              <a:ext uri="{FF2B5EF4-FFF2-40B4-BE49-F238E27FC236}">
+                <a16:creationId xmlns:a16="http://schemas.microsoft.com/office/drawing/2014/main" id="{A4CC4290-6036-2A56-FB56-5991F8242FD1}"/>
+              </a:ext>
+            </a:extLst>
+          </p:cNvPr>
+          <p:cNvSpPr txBox="1"/>
+          <p:nvPr/>
+        </p:nvSpPr>
+        <p:spPr>
+          <a:xfrm>
+            <a:off x="438150" y="3000375"/>
+            <a:ext cx="3476625" cy="2308324"/>
+          </a:xfrm>
+          <a:prstGeom prst="rect">
+            <a:avLst/>
+          </a:prstGeom>
+          <a:noFill/>
+        </p:spPr>
+        <p:txBody>
+          <a:bodyPr wrap="square" rtlCol="0">
+            <a:spAutoFit/>
+          </a:bodyPr>
+          <a:lstStyle/>
+          <a:p>
+            <a:pPr marL="285750" indent="-285750">
+              <a:buFont typeface="Arial" panose="020B0604020202020204" pitchFamily="34" charset="0"/>
+              <a:buChar char="•"/>
+            </a:pPr>
+            <a:r>
+              <a:rPr lang="en-US" sz="2400" dirty="0">
+                <a:solidFill>
+                  <a:schemeClr val="bg1"/>
+                </a:solidFill>
+              </a:rPr>
+              <a:t>Exploring new events</a:t>
+            </a:r>
+          </a:p>
+          <a:p>
+            <a:pPr marL="285750" indent="-285750">
+              <a:buFont typeface="Arial" panose="020B0604020202020204" pitchFamily="34" charset="0"/>
+              <a:buChar char="•"/>
+            </a:pPr>
+            <a:r>
+              <a:rPr lang="en-US" sz="2400" dirty="0">
+                <a:solidFill>
+                  <a:schemeClr val="bg1"/>
+                </a:solidFill>
+              </a:rPr>
+              <a:t>Basic information about every event</a:t>
+            </a:r>
+          </a:p>
+          <a:p>
+            <a:pPr marL="285750" indent="-285750">
+              <a:buFont typeface="Arial" panose="020B0604020202020204" pitchFamily="34" charset="0"/>
+              <a:buChar char="•"/>
+            </a:pPr>
+            <a:r>
+              <a:rPr lang="en-US" sz="2400" dirty="0">
+                <a:solidFill>
+                  <a:schemeClr val="bg1"/>
+                </a:solidFill>
+              </a:rPr>
+              <a:t>Details for more information</a:t>
+            </a:r>
+            <a:endParaRPr lang="hr-HR" sz="2400" dirty="0">
+              <a:solidFill>
+                <a:schemeClr val="bg1"/>
+              </a:solidFill>
+            </a:endParaRPr>
+          </a:p>
+        </p:txBody>
+      </p:sp>
+    </p:spTree>
+    <p:extLst>
+      <p:ext uri="{BB962C8B-B14F-4D97-AF65-F5344CB8AC3E}">
+        <p14:creationId xmlns:p14="http://schemas.microsoft.com/office/powerpoint/2010/main" val="458643066"/>
+      </p:ext>
+    </p:extLst>
+  </p:cSld>
+  <p:clrMapOvr>
+    <a:overrideClrMapping bg1="lt1" tx1="dk1" bg2="lt2" tx2="dk2" accent1="accent1" accent2="accent2" accent3="accent3" accent4="accent4" accent5="accent5" accent6="accent6" hlink="hlink" folHlink="folHlink"/>
+  </p:clrMapOvr>
+</p:sld>
+</file>
+
+<file path=ppt/slides/slide11.xml><?xml version="1.0" encoding="utf-8"?>
+<p:sld xmlns:a="http://schemas.openxmlformats.org/drawingml/2006/main" xmlns:r="http://schemas.openxmlformats.org/officeDocument/2006/relationships" xmlns:p="http://schemas.openxmlformats.org/presentationml/2006/main">
+  <p:cSld>
+    <p:bg>
+      <p:bgPr>
+        <a:solidFill>
+          <a:schemeClr val="bg2"/>
+        </a:solidFill>
+        <a:effectLst/>
+      </p:bgPr>
+    </p:bg>
+    <p:spTree>
+      <p:nvGrpSpPr>
+        <p:cNvPr id="1" name=""/>
+        <p:cNvGrpSpPr/>
+        <p:nvPr/>
+      </p:nvGrpSpPr>
+      <p:grpSpPr>
+        <a:xfrm>
+          <a:off x="0" y="0"/>
+          <a:ext cx="0" cy="0"/>
+          <a:chOff x="0" y="0"/>
+          <a:chExt cx="0" cy="0"/>
+        </a:xfrm>
+      </p:grpSpPr>
+      <p:sp>
+        <p:nvSpPr>
+          <p:cNvPr id="2" name="Naslov 1">
+            <a:extLst>
+              <a:ext uri="{FF2B5EF4-FFF2-40B4-BE49-F238E27FC236}">
+                <a16:creationId xmlns:a16="http://schemas.microsoft.com/office/drawing/2014/main" id="{768485EA-81BC-4660-3DAE-991DDA2F1511}"/>
+              </a:ext>
+            </a:extLst>
+          </p:cNvPr>
+          <p:cNvSpPr>
+            <a:spLocks noGrp="1"/>
+          </p:cNvSpPr>
+          <p:nvPr>
+            <p:ph type="title"/>
+          </p:nvPr>
+        </p:nvSpPr>
+        <p:spPr>
+          <a:xfrm>
+            <a:off x="810000" y="447188"/>
+            <a:ext cx="10571998" cy="970450"/>
+          </a:xfrm>
+        </p:spPr>
+        <p:txBody>
+          <a:bodyPr vert="horz" lIns="91440" tIns="45720" rIns="91440" bIns="45720" rtlCol="0">
+            <a:normAutofit/>
+          </a:bodyPr>
+          <a:lstStyle/>
+          <a:p>
+            <a:r>
+              <a:rPr lang="en-US"/>
+              <a:t>Creating a new event</a:t>
+            </a:r>
+          </a:p>
+        </p:txBody>
+      </p:sp>
+      <p:sp>
+        <p:nvSpPr>
+          <p:cNvPr id="27" name="Content Placeholder 26">
+            <a:extLst>
+              <a:ext uri="{FF2B5EF4-FFF2-40B4-BE49-F238E27FC236}">
+                <a16:creationId xmlns:a16="http://schemas.microsoft.com/office/drawing/2014/main" id="{2A4D26A3-36A3-9F5E-BC02-522A9F3B4F9C}"/>
+              </a:ext>
+            </a:extLst>
+          </p:cNvPr>
+          <p:cNvSpPr>
+            <a:spLocks noGrp="1"/>
+          </p:cNvSpPr>
+          <p:nvPr>
+            <p:ph idx="1"/>
+          </p:nvPr>
+        </p:nvSpPr>
+        <p:spPr>
+          <a:xfrm>
+            <a:off x="818713" y="2413000"/>
+            <a:ext cx="3835583" cy="3632200"/>
+          </a:xfrm>
+        </p:spPr>
+        <p:txBody>
+          <a:bodyPr>
+            <a:normAutofit/>
+          </a:bodyPr>
+          <a:lstStyle/>
+          <a:p>
+            <a:endParaRPr lang="en-US" sz="1600"/>
+          </a:p>
+        </p:txBody>
+      </p:sp>
+      <p:pic>
+        <p:nvPicPr>
+          <p:cNvPr id="5" name="Rezervirano mjesto sadržaja 4">
+            <a:extLst>
+              <a:ext uri="{FF2B5EF4-FFF2-40B4-BE49-F238E27FC236}">
+                <a16:creationId xmlns:a16="http://schemas.microsoft.com/office/drawing/2014/main" id="{4378B3CA-2420-645E-9B38-0F3813B372D2}"/>
+              </a:ext>
+            </a:extLst>
+          </p:cNvPr>
+          <p:cNvPicPr>
+            <a:picLocks noChangeAspect="1"/>
+          </p:cNvPicPr>
+          <p:nvPr/>
+        </p:nvPicPr>
+        <p:blipFill>
+          <a:blip r:embed="rId2">
+            <a:extLst>
+              <a:ext uri="{28A0092B-C50C-407E-A947-70E740481C1C}">
+                <a14:useLocalDpi xmlns:a14="http://schemas.microsoft.com/office/drawing/2010/main" val="0"/>
+              </a:ext>
+            </a:extLst>
+          </a:blip>
+          <a:stretch>
+            <a:fillRect/>
+          </a:stretch>
+        </p:blipFill>
+        <p:spPr>
+          <a:xfrm>
+            <a:off x="3048866" y="2197980"/>
+            <a:ext cx="6864933" cy="4530856"/>
+          </a:xfrm>
+          <a:prstGeom prst="roundRect">
+            <a:avLst>
+              <a:gd name="adj" fmla="val 3876"/>
+            </a:avLst>
+          </a:prstGeom>
+          <a:ln>
+            <a:solidFill>
+              <a:schemeClr val="accent1"/>
+            </a:solidFill>
+          </a:ln>
+          <a:effectLst/>
+        </p:spPr>
+      </p:pic>
+    </p:spTree>
+    <p:extLst>
+      <p:ext uri="{BB962C8B-B14F-4D97-AF65-F5344CB8AC3E}">
+        <p14:creationId xmlns:p14="http://schemas.microsoft.com/office/powerpoint/2010/main" val="1536467406"/>
+      </p:ext>
+    </p:extLst>
+  </p:cSld>
+  <p:clrMapOvr>
+    <a:masterClrMapping/>
+  </p:clrMapOvr>
+</p:sld>
+</file>
+
+<file path=ppt/slides/slide12.xml><?xml version="1.0" encoding="utf-8"?>
+<p:sld xmlns:a="http://schemas.openxmlformats.org/drawingml/2006/main" xmlns:r="http://schemas.openxmlformats.org/officeDocument/2006/relationships" xmlns:p="http://schemas.openxmlformats.org/presentationml/2006/main">
+  <p:cSld>
+    <p:bg>
+      <p:bgPr>
+        <a:solidFill>
+          <a:schemeClr val="bg1"/>
+        </a:solidFill>
+        <a:effectLst/>
+      </p:bgPr>
+    </p:bg>
+    <p:spTree>
+      <p:nvGrpSpPr>
+        <p:cNvPr id="1" name=""/>
+        <p:cNvGrpSpPr/>
+        <p:nvPr/>
+      </p:nvGrpSpPr>
+      <p:grpSpPr>
+        <a:xfrm>
+          <a:off x="0" y="0"/>
+          <a:ext cx="0" cy="0"/>
+          <a:chOff x="0" y="0"/>
+          <a:chExt cx="0" cy="0"/>
+        </a:xfrm>
+      </p:grpSpPr>
+      <p:sp>
+        <p:nvSpPr>
+          <p:cNvPr id="10" name="Freeform 6">
+            <a:extLst>
+              <a:ext uri="{FF2B5EF4-FFF2-40B4-BE49-F238E27FC236}">
+                <a16:creationId xmlns:a16="http://schemas.microsoft.com/office/drawing/2014/main" id="{133F8CB7-795C-4272-9073-64D8CF97F220}"/>
+              </a:ext>
+              <a:ext uri="{C183D7F6-B498-43B3-948B-1728B52AA6E4}">
+                <adec:decorative xmlns:adec="http://schemas.microsoft.com/office/drawing/2017/decorative" val="1"/>
+              </a:ext>
+            </a:extLst>
+          </p:cNvPr>
+          <p:cNvSpPr>
+            <a:spLocks noGrp="1" noRot="1" noChangeAspect="1" noMove="1" noResize="1" noEditPoints="1" noAdjustHandles="1" noChangeArrowheads="1" noChangeShapeType="1" noTextEdit="1"/>
+          </p:cNvSpPr>
+          <p:nvPr>
+            <p:extLst>
+              <p:ext uri="{386F3935-93C4-4BCD-93E2-E3B085C9AB24}">
+                <p16:designElem xmlns:p16="http://schemas.microsoft.com/office/powerpoint/2015/main" val="1"/>
+              </p:ext>
+            </p:extLst>
+          </p:nvPr>
+        </p:nvSpPr>
+        <p:spPr bwMode="auto">
+          <a:xfrm>
+            <a:off x="0" y="-3175"/>
+            <a:ext cx="12192000" cy="5203825"/>
+          </a:xfrm>
+          <a:custGeom>
+            <a:avLst/>
+            <a:gdLst/>
+            <a:ahLst/>
+            <a:cxnLst/>
+            <a:rect l="0" t="0" r="r" b="b"/>
+            <a:pathLst>
+              <a:path w="5760" h="3278">
+                <a:moveTo>
+                  <a:pt x="5760" y="0"/>
+                </a:moveTo>
+                <a:lnTo>
+                  <a:pt x="0" y="0"/>
+                </a:lnTo>
+                <a:lnTo>
+                  <a:pt x="0" y="3090"/>
+                </a:lnTo>
+                <a:lnTo>
+                  <a:pt x="943" y="3090"/>
+                </a:lnTo>
+                <a:lnTo>
+                  <a:pt x="1123" y="3270"/>
+                </a:lnTo>
+                <a:lnTo>
+                  <a:pt x="1123" y="3270"/>
+                </a:lnTo>
+                <a:lnTo>
+                  <a:pt x="1127" y="3272"/>
+                </a:lnTo>
+                <a:lnTo>
+                  <a:pt x="1133" y="3275"/>
+                </a:lnTo>
+                <a:lnTo>
+                  <a:pt x="1139" y="3278"/>
+                </a:lnTo>
+                <a:lnTo>
+                  <a:pt x="1144" y="3278"/>
+                </a:lnTo>
+                <a:lnTo>
+                  <a:pt x="1150" y="3278"/>
+                </a:lnTo>
+                <a:lnTo>
+                  <a:pt x="1155" y="3275"/>
+                </a:lnTo>
+                <a:lnTo>
+                  <a:pt x="1161" y="3272"/>
+                </a:lnTo>
+                <a:lnTo>
+                  <a:pt x="1165" y="3270"/>
+                </a:lnTo>
+                <a:lnTo>
+                  <a:pt x="1345" y="3090"/>
+                </a:lnTo>
+                <a:lnTo>
+                  <a:pt x="5760" y="3090"/>
+                </a:lnTo>
+                <a:lnTo>
+                  <a:pt x="5760" y="0"/>
+                </a:lnTo>
+                <a:close/>
+              </a:path>
+            </a:pathLst>
+          </a:custGeom>
+          <a:ln/>
+          <a:effectLst/>
+          <a:extLst>
+            <a:ext uri="{91240B29-F687-4f45-9708-019B960494DF}">
+              <a14:hiddenLine xmlns:a14="http://schemas.microsoft.com/office/drawing/2010/main" xmlns:p14="http://schemas.microsoft.com/office/powerpoint/2010/main" xmlns:a16="http://schemas.microsoft.com/office/drawing/2014/main" xmlns="" w="9525">
+                <a:solidFill>
+                  <a:srgbClr val="000000"/>
+                </a:solidFill>
+                <a:round/>
+                <a:headEnd/>
+                <a:tailEnd/>
+              </a14:hiddenLine>
+            </a:ext>
+          </a:extLst>
+        </p:spPr>
+        <p:style>
+          <a:lnRef idx="1">
+            <a:schemeClr val="accent1"/>
+          </a:lnRef>
+          <a:fillRef idx="3">
+            <a:schemeClr val="accent1"/>
+          </a:fillRef>
+          <a:effectRef idx="2">
+            <a:schemeClr val="accent1"/>
+          </a:effectRef>
+          <a:fontRef idx="minor">
+            <a:schemeClr val="lt1"/>
+          </a:fontRef>
+        </p:style>
+      </p:sp>
+      <p:sp>
+        <p:nvSpPr>
+          <p:cNvPr id="12" name="Rectangle 11">
+            <a:extLst>
+              <a:ext uri="{FF2B5EF4-FFF2-40B4-BE49-F238E27FC236}">
+                <a16:creationId xmlns:a16="http://schemas.microsoft.com/office/drawing/2014/main" id="{79277119-B941-4A45-9322-FA2BC135DE62}"/>
+              </a:ext>
+              <a:ext uri="{C183D7F6-B498-43B3-948B-1728B52AA6E4}">
+                <adec:decorative xmlns:adec="http://schemas.microsoft.com/office/drawing/2017/decorative" val="1"/>
+              </a:ext>
+            </a:extLst>
+          </p:cNvPr>
+          <p:cNvSpPr>
+            <a:spLocks noGrp="1" noRot="1" noChangeAspect="1" noMove="1" noResize="1" noEditPoints="1" noAdjustHandles="1" noChangeArrowheads="1" noChangeShapeType="1" noTextEdit="1"/>
+          </p:cNvSpPr>
+          <p:nvPr>
+            <p:extLst>
+              <p:ext uri="{386F3935-93C4-4BCD-93E2-E3B085C9AB24}">
+                <p16:designElem xmlns:p16="http://schemas.microsoft.com/office/powerpoint/2015/main" val="1"/>
+              </p:ext>
+            </p:extLst>
+          </p:nvPr>
+        </p:nvSpPr>
+        <p:spPr>
+          <a:xfrm>
+            <a:off x="0" y="0"/>
+            <a:ext cx="12192000" cy="6858000"/>
+          </a:xfrm>
+          <a:prstGeom prst="rect">
+            <a:avLst/>
+          </a:prstGeom>
+          <a:solidFill>
+            <a:schemeClr val="bg1"/>
+          </a:solidFill>
+          <a:ln>
+            <a:noFill/>
+          </a:ln>
+        </p:spPr>
+        <p:style>
+          <a:lnRef idx="2">
+            <a:schemeClr val="accent1">
+              <a:shade val="50000"/>
+            </a:schemeClr>
+          </a:lnRef>
+          <a:fillRef idx="1">
+            <a:schemeClr val="accent1"/>
+          </a:fillRef>
+          <a:effectRef idx="0">
+            <a:schemeClr val="accent1"/>
+          </a:effectRef>
+          <a:fontRef idx="minor">
+            <a:schemeClr val="lt1"/>
+          </a:fontRef>
+        </p:style>
+        <p:txBody>
+          <a:bodyPr rtlCol="0" anchor="ctr"/>
+          <a:lstStyle/>
+          <a:p>
+            <a:pPr algn="ctr"/>
+            <a:endParaRPr lang="en-US"/>
+          </a:p>
+        </p:txBody>
+      </p:sp>
+      <p:sp>
+        <p:nvSpPr>
+          <p:cNvPr id="14" name="Freeform 23">
+            <a:extLst>
+              <a:ext uri="{FF2B5EF4-FFF2-40B4-BE49-F238E27FC236}">
+                <a16:creationId xmlns:a16="http://schemas.microsoft.com/office/drawing/2014/main" id="{DFDB457D-F372-428B-A10D-41080EF9382A}"/>
+              </a:ext>
+              <a:ext uri="{C183D7F6-B498-43B3-948B-1728B52AA6E4}">
+                <adec:decorative xmlns:adec="http://schemas.microsoft.com/office/drawing/2017/decorative" val="1"/>
+              </a:ext>
+            </a:extLst>
+          </p:cNvPr>
+          <p:cNvSpPr>
+            <a:spLocks noGrp="1" noRot="1" noChangeAspect="1" noMove="1" noResize="1" noEditPoints="1" noAdjustHandles="1" noChangeArrowheads="1" noChangeShapeType="1" noTextEdit="1"/>
+          </p:cNvSpPr>
+          <p:nvPr>
+            <p:extLst>
+              <p:ext uri="{386F3935-93C4-4BCD-93E2-E3B085C9AB24}">
+                <p16:designElem xmlns:p16="http://schemas.microsoft.com/office/powerpoint/2015/main" val="1"/>
+              </p:ext>
+            </p:extLst>
+          </p:nvPr>
+        </p:nvSpPr>
+        <p:spPr bwMode="white">
+          <a:xfrm flipH="1">
+            <a:off x="7554995" y="0"/>
+            <a:ext cx="4637005" cy="6858000"/>
+          </a:xfrm>
+          <a:custGeom>
+            <a:avLst/>
+            <a:gdLst>
+              <a:gd name="connsiteX0" fmla="*/ 0 w 4637005"/>
+              <a:gd name="connsiteY0" fmla="*/ 0 h 6858000"/>
+              <a:gd name="connsiteX1" fmla="*/ 4637005 w 4637005"/>
+              <a:gd name="connsiteY1" fmla="*/ 0 h 6858000"/>
+              <a:gd name="connsiteX2" fmla="*/ 4637005 w 4637005"/>
+              <a:gd name="connsiteY2" fmla="*/ 1900238 h 6858000"/>
+              <a:gd name="connsiteX3" fmla="*/ 4266589 w 4637005"/>
+              <a:gd name="connsiteY3" fmla="*/ 2178050 h 6858000"/>
+              <a:gd name="connsiteX4" fmla="*/ 4262355 w 4637005"/>
+              <a:gd name="connsiteY4" fmla="*/ 2184400 h 6858000"/>
+              <a:gd name="connsiteX5" fmla="*/ 4256005 w 4637005"/>
+              <a:gd name="connsiteY5" fmla="*/ 2193925 h 6858000"/>
+              <a:gd name="connsiteX6" fmla="*/ 4249655 w 4637005"/>
+              <a:gd name="connsiteY6" fmla="*/ 2201863 h 6858000"/>
+              <a:gd name="connsiteX7" fmla="*/ 4249655 w 4637005"/>
+              <a:gd name="connsiteY7" fmla="*/ 2211388 h 6858000"/>
+              <a:gd name="connsiteX8" fmla="*/ 4249655 w 4637005"/>
+              <a:gd name="connsiteY8" fmla="*/ 2220913 h 6858000"/>
+              <a:gd name="connsiteX9" fmla="*/ 4256005 w 4637005"/>
+              <a:gd name="connsiteY9" fmla="*/ 2228850 h 6858000"/>
+              <a:gd name="connsiteX10" fmla="*/ 4262355 w 4637005"/>
+              <a:gd name="connsiteY10" fmla="*/ 2238375 h 6858000"/>
+              <a:gd name="connsiteX11" fmla="*/ 4266589 w 4637005"/>
+              <a:gd name="connsiteY11" fmla="*/ 2244725 h 6858000"/>
+              <a:gd name="connsiteX12" fmla="*/ 4637005 w 4637005"/>
+              <a:gd name="connsiteY12" fmla="*/ 2522538 h 6858000"/>
+              <a:gd name="connsiteX13" fmla="*/ 4637005 w 4637005"/>
+              <a:gd name="connsiteY13" fmla="*/ 6858000 h 6858000"/>
+              <a:gd name="connsiteX14" fmla="*/ 0 w 4637005"/>
+              <a:gd name="connsiteY14" fmla="*/ 6858000 h 6858000"/>
+            </a:gdLst>
+            <a:ahLst/>
+            <a:cxnLst>
+              <a:cxn ang="0">
+                <a:pos x="connsiteX0" y="connsiteY0"/>
+              </a:cxn>
+              <a:cxn ang="0">
+                <a:pos x="connsiteX1" y="connsiteY1"/>
+              </a:cxn>
+              <a:cxn ang="0">
+                <a:pos x="connsiteX2" y="connsiteY2"/>
+              </a:cxn>
+              <a:cxn ang="0">
+                <a:pos x="connsiteX3" y="connsiteY3"/>
+              </a:cxn>
+              <a:cxn ang="0">
+                <a:pos x="connsiteX4" y="connsiteY4"/>
+              </a:cxn>
+              <a:cxn ang="0">
+                <a:pos x="connsiteX5" y="connsiteY5"/>
+              </a:cxn>
+              <a:cxn ang="0">
+                <a:pos x="connsiteX6" y="connsiteY6"/>
+              </a:cxn>
+              <a:cxn ang="0">
+                <a:pos x="connsiteX7" y="connsiteY7"/>
+              </a:cxn>
+              <a:cxn ang="0">
+                <a:pos x="connsiteX8" y="connsiteY8"/>
+              </a:cxn>
+              <a:cxn ang="0">
+                <a:pos x="connsiteX9" y="connsiteY9"/>
+              </a:cxn>
+              <a:cxn ang="0">
+                <a:pos x="connsiteX10" y="connsiteY10"/>
+              </a:cxn>
+              <a:cxn ang="0">
+                <a:pos x="connsiteX11" y="connsiteY11"/>
+              </a:cxn>
+              <a:cxn ang="0">
+                <a:pos x="connsiteX12" y="connsiteY12"/>
+              </a:cxn>
+              <a:cxn ang="0">
+                <a:pos x="connsiteX13" y="connsiteY13"/>
+              </a:cxn>
+              <a:cxn ang="0">
+                <a:pos x="connsiteX14" y="connsiteY14"/>
+              </a:cxn>
+            </a:cxnLst>
+            <a:rect l="l" t="t" r="r" b="b"/>
+            <a:pathLst>
+              <a:path w="4637005" h="6858000">
+                <a:moveTo>
+                  <a:pt x="0" y="0"/>
+                </a:moveTo>
+                <a:lnTo>
+                  <a:pt x="4637005" y="0"/>
+                </a:lnTo>
+                <a:lnTo>
+                  <a:pt x="4637005" y="1900238"/>
+                </a:lnTo>
+                <a:lnTo>
+                  <a:pt x="4266589" y="2178050"/>
+                </a:lnTo>
+                <a:lnTo>
+                  <a:pt x="4262355" y="2184400"/>
+                </a:lnTo>
+                <a:lnTo>
+                  <a:pt x="4256005" y="2193925"/>
+                </a:lnTo>
+                <a:lnTo>
+                  <a:pt x="4249655" y="2201863"/>
+                </a:lnTo>
+                <a:lnTo>
+                  <a:pt x="4249655" y="2211388"/>
+                </a:lnTo>
+                <a:lnTo>
+                  <a:pt x="4249655" y="2220913"/>
+                </a:lnTo>
+                <a:lnTo>
+                  <a:pt x="4256005" y="2228850"/>
+                </a:lnTo>
+                <a:lnTo>
+                  <a:pt x="4262355" y="2238375"/>
+                </a:lnTo>
+                <a:lnTo>
+                  <a:pt x="4266589" y="2244725"/>
+                </a:lnTo>
+                <a:lnTo>
+                  <a:pt x="4637005" y="2522538"/>
+                </a:lnTo>
+                <a:lnTo>
+                  <a:pt x="4637005" y="6858000"/>
+                </a:lnTo>
+                <a:lnTo>
+                  <a:pt x="0" y="6858000"/>
+                </a:lnTo>
+                <a:close/>
+              </a:path>
+            </a:pathLst>
+          </a:custGeom>
+          <a:blipFill>
+            <a:blip r:embed="rId2">
+              <a:duotone>
+                <a:schemeClr val="accent1">
+                  <a:tint val="98000"/>
+                  <a:lumMod val="102000"/>
+                </a:schemeClr>
+                <a:schemeClr val="accent1">
+                  <a:shade val="98000"/>
+                  <a:lumMod val="98000"/>
+                </a:schemeClr>
+              </a:duotone>
+            </a:blip>
+            <a:tile tx="0" ty="0" sx="100000" sy="100000" flip="none" algn="tl"/>
+          </a:blipFill>
+          <a:ln>
+            <a:headEnd/>
+            <a:tailEnd/>
+          </a:ln>
+        </p:spPr>
+        <p:style>
+          <a:lnRef idx="1">
+            <a:schemeClr val="accent1"/>
+          </a:lnRef>
+          <a:fillRef idx="3">
+            <a:schemeClr val="accent1"/>
+          </a:fillRef>
+          <a:effectRef idx="2">
+            <a:schemeClr val="accent1"/>
+          </a:effectRef>
+          <a:fontRef idx="minor">
+            <a:schemeClr val="lt1"/>
+          </a:fontRef>
+        </p:style>
+        <p:txBody>
+          <a:bodyPr wrap="square" rtlCol="0" anchor="ctr">
+            <a:noAutofit/>
+          </a:bodyPr>
+          <a:lstStyle/>
+          <a:p>
+            <a:pPr algn="ctr"/>
+            <a:endParaRPr lang="en-US"/>
+          </a:p>
+        </p:txBody>
+      </p:sp>
+      <p:sp>
+        <p:nvSpPr>
+          <p:cNvPr id="2" name="Naslov 1">
+            <a:extLst>
+              <a:ext uri="{FF2B5EF4-FFF2-40B4-BE49-F238E27FC236}">
+                <a16:creationId xmlns:a16="http://schemas.microsoft.com/office/drawing/2014/main" id="{4AC49F4B-2BAB-7EAD-E28E-CC3C2AAF9346}"/>
+              </a:ext>
+            </a:extLst>
+          </p:cNvPr>
+          <p:cNvSpPr>
+            <a:spLocks noGrp="1"/>
+          </p:cNvSpPr>
+          <p:nvPr>
+            <p:ph type="title"/>
+          </p:nvPr>
+        </p:nvSpPr>
+        <p:spPr>
+          <a:xfrm>
+            <a:off x="8134349" y="1819275"/>
+            <a:ext cx="3606137" cy="776143"/>
+          </a:xfrm>
+        </p:spPr>
+        <p:txBody>
+          <a:bodyPr vert="horz" lIns="91440" tIns="45720" rIns="91440" bIns="45720" rtlCol="0" anchor="t">
+            <a:normAutofit/>
+          </a:bodyPr>
+          <a:lstStyle/>
+          <a:p>
+            <a:r>
+              <a:rPr lang="en-US" sz="4400" dirty="0"/>
+              <a:t>My events</a:t>
+            </a:r>
+          </a:p>
+        </p:txBody>
+      </p:sp>
+      <p:pic>
+        <p:nvPicPr>
+          <p:cNvPr id="5" name="Rezervirano mjesto sadržaja 4">
+            <a:extLst>
+              <a:ext uri="{FF2B5EF4-FFF2-40B4-BE49-F238E27FC236}">
+                <a16:creationId xmlns:a16="http://schemas.microsoft.com/office/drawing/2014/main" id="{B1B3B11A-6C12-9785-AC16-3D7868898CC9}"/>
+              </a:ext>
+            </a:extLst>
+          </p:cNvPr>
+          <p:cNvPicPr>
+            <a:picLocks noGrp="1" noChangeAspect="1"/>
+          </p:cNvPicPr>
+          <p:nvPr>
+            <p:ph idx="1"/>
+          </p:nvPr>
+        </p:nvPicPr>
+        <p:blipFill>
+          <a:blip r:embed="rId3">
+            <a:extLst>
+              <a:ext uri="{28A0092B-C50C-407E-A947-70E740481C1C}">
+                <a14:useLocalDpi xmlns:a14="http://schemas.microsoft.com/office/drawing/2010/main" val="0"/>
+              </a:ext>
+            </a:extLst>
+          </a:blip>
+          <a:stretch>
+            <a:fillRect/>
+          </a:stretch>
+        </p:blipFill>
+        <p:spPr>
+          <a:xfrm>
+            <a:off x="643467" y="1744059"/>
+            <a:ext cx="6268060" cy="3196711"/>
+          </a:xfrm>
+          <a:prstGeom prst="roundRect">
+            <a:avLst>
+              <a:gd name="adj" fmla="val 3876"/>
+            </a:avLst>
+          </a:prstGeom>
+          <a:ln>
+            <a:solidFill>
+              <a:schemeClr val="accent1"/>
+            </a:solidFill>
+          </a:ln>
+          <a:effectLst/>
+        </p:spPr>
+      </p:pic>
+      <p:sp>
+        <p:nvSpPr>
+          <p:cNvPr id="3" name="TekstniOkvir 2">
+            <a:extLst>
+              <a:ext uri="{FF2B5EF4-FFF2-40B4-BE49-F238E27FC236}">
+                <a16:creationId xmlns:a16="http://schemas.microsoft.com/office/drawing/2014/main" id="{82A46A3F-6B72-1626-6A6B-C4C5BA4BC329}"/>
+              </a:ext>
+            </a:extLst>
+          </p:cNvPr>
+          <p:cNvSpPr txBox="1"/>
+          <p:nvPr/>
+        </p:nvSpPr>
+        <p:spPr>
+          <a:xfrm>
+            <a:off x="8183418" y="2918691"/>
+            <a:ext cx="3435927" cy="1815882"/>
+          </a:xfrm>
+          <a:prstGeom prst="rect">
+            <a:avLst/>
+          </a:prstGeom>
+          <a:noFill/>
+        </p:spPr>
+        <p:txBody>
+          <a:bodyPr wrap="square" rtlCol="0">
+            <a:spAutoFit/>
+          </a:bodyPr>
+          <a:lstStyle/>
+          <a:p>
+            <a:pPr marL="285750" indent="-285750">
+              <a:buFont typeface="Arial" panose="020B0604020202020204" pitchFamily="34" charset="0"/>
+              <a:buChar char="•"/>
+            </a:pPr>
+            <a:r>
+              <a:rPr lang="en-US" sz="2800" dirty="0">
+                <a:solidFill>
+                  <a:schemeClr val="bg1"/>
+                </a:solidFill>
+              </a:rPr>
+              <a:t>Current user’s events</a:t>
+            </a:r>
+          </a:p>
+          <a:p>
+            <a:pPr marL="285750" indent="-285750">
+              <a:buFont typeface="Arial" panose="020B0604020202020204" pitchFamily="34" charset="0"/>
+              <a:buChar char="•"/>
+            </a:pPr>
+            <a:r>
+              <a:rPr lang="en-US" sz="2800" dirty="0">
+                <a:solidFill>
+                  <a:schemeClr val="bg1"/>
+                </a:solidFill>
+              </a:rPr>
+              <a:t>Hosting or participating</a:t>
+            </a:r>
+            <a:endParaRPr lang="hr-HR" sz="2800" dirty="0">
+              <a:solidFill>
+                <a:schemeClr val="bg1"/>
+              </a:solidFill>
+            </a:endParaRPr>
+          </a:p>
+        </p:txBody>
+      </p:sp>
+    </p:spTree>
+    <p:extLst>
+      <p:ext uri="{BB962C8B-B14F-4D97-AF65-F5344CB8AC3E}">
+        <p14:creationId xmlns:p14="http://schemas.microsoft.com/office/powerpoint/2010/main" val="665220501"/>
+      </p:ext>
+    </p:extLst>
+  </p:cSld>
+  <p:clrMapOvr>
+    <a:overrideClrMapping bg1="lt1" tx1="dk1" bg2="lt2" tx2="dk2" accent1="accent1" accent2="accent2" accent3="accent3" accent4="accent4" accent5="accent5" accent6="accent6" hlink="hlink" folHlink="folHlink"/>
+  </p:clrMapOvr>
+</p:sld>
+</file>
+
+<file path=ppt/slides/slide13.xml><?xml version="1.0" encoding="utf-8"?>
 <p:sld xmlns:a="http://schemas.openxmlformats.org/drawingml/2006/main" xmlns:r="http://schemas.openxmlformats.org/officeDocument/2006/relationships" xmlns:p="http://schemas.openxmlformats.org/presentationml/2006/main">
   <p:cSld>
     <p:bg>
@@ -5877,7 +7183,7 @@
 </p:sld>
 </file>
 
-<file path=ppt/slides/slide11.xml><?xml version="1.0" encoding="utf-8"?>
+<file path=ppt/slides/slide14.xml><?xml version="1.0" encoding="utf-8"?>
 <p:sld xmlns:a="http://schemas.openxmlformats.org/drawingml/2006/main" xmlns:r="http://schemas.openxmlformats.org/officeDocument/2006/relationships" xmlns:p="http://schemas.openxmlformats.org/presentationml/2006/main">
   <p:cSld>
     <p:bg>
@@ -6596,7 +7902,7 @@
 </p:sld>
 </file>
 
-<file path=ppt/slides/slide12.xml><?xml version="1.0" encoding="utf-8"?>
+<file path=ppt/slides/slide15.xml><?xml version="1.0" encoding="utf-8"?>
 <p:sld xmlns:a="http://schemas.openxmlformats.org/drawingml/2006/main" xmlns:r="http://schemas.openxmlformats.org/officeDocument/2006/relationships" xmlns:p="http://schemas.openxmlformats.org/presentationml/2006/main">
   <p:cSld>
     <p:spTree>
@@ -6873,7 +8179,7 @@
 </p:sld>
 </file>
 
-<file path=ppt/slides/slide13.xml><?xml version="1.0" encoding="utf-8"?>
+<file path=ppt/slides/slide16.xml><?xml version="1.0" encoding="utf-8"?>
 <p:sld xmlns:a="http://schemas.openxmlformats.org/drawingml/2006/main" xmlns:r="http://schemas.openxmlformats.org/officeDocument/2006/relationships" xmlns:p="http://schemas.openxmlformats.org/presentationml/2006/main">
   <p:cSld>
     <p:bg>
@@ -7518,7 +8824,7 @@
 </p:sld>
 </file>
 
-<file path=ppt/slides/slide14.xml><?xml version="1.0" encoding="utf-8"?>
+<file path=ppt/slides/slide17.xml><?xml version="1.0" encoding="utf-8"?>
 <p:sld xmlns:a="http://schemas.openxmlformats.org/drawingml/2006/main" xmlns:r="http://schemas.openxmlformats.org/officeDocument/2006/relationships" xmlns:p="http://schemas.openxmlformats.org/presentationml/2006/main">
   <p:cSld>
     <p:spTree>
@@ -7582,10 +8888,28 @@
         </p:nvSpPr>
         <p:spPr/>
         <p:txBody>
-          <a:bodyPr/>
+          <a:bodyPr>
+            <a:normAutofit/>
+          </a:bodyPr>
           <a:lstStyle/>
           <a:p>
-            <a:endParaRPr lang="hr-HR" dirty="0"/>
+            <a:r>
+              <a:rPr lang="en-US" sz="2800" dirty="0"/>
+              <a:t>Organize events easier</a:t>
+            </a:r>
+          </a:p>
+          <a:p>
+            <a:r>
+              <a:rPr lang="en-US" sz="2800" dirty="0"/>
+              <a:t>Find new people</a:t>
+            </a:r>
+          </a:p>
+          <a:p>
+            <a:r>
+              <a:rPr lang="en-US" sz="2800" dirty="0"/>
+              <a:t>Enjoy playing different sports</a:t>
+            </a:r>
+            <a:endParaRPr lang="hr-HR" sz="2800" dirty="0"/>
           </a:p>
         </p:txBody>
       </p:sp>
@@ -7602,7 +8926,7 @@
 </p:sld>
 </file>
 
-<file path=ppt/slides/slide15.xml><?xml version="1.0" encoding="utf-8"?>
+<file path=ppt/slides/slide18.xml><?xml version="1.0" encoding="utf-8"?>
 <p:sld xmlns:a="http://schemas.openxmlformats.org/drawingml/2006/main" xmlns:r="http://schemas.openxmlformats.org/officeDocument/2006/relationships" xmlns:p="http://schemas.openxmlformats.org/presentationml/2006/main">
   <p:cSld>
     <p:bg>
@@ -8104,6 +9428,743 @@
     <p:bg>
       <p:bgPr>
         <a:solidFill>
+          <a:schemeClr val="bg1"/>
+        </a:solidFill>
+        <a:effectLst/>
+      </p:bgPr>
+    </p:bg>
+    <p:spTree>
+      <p:nvGrpSpPr>
+        <p:cNvPr id="1" name=""/>
+        <p:cNvGrpSpPr/>
+        <p:nvPr/>
+      </p:nvGrpSpPr>
+      <p:grpSpPr>
+        <a:xfrm>
+          <a:off x="0" y="0"/>
+          <a:ext cx="0" cy="0"/>
+          <a:chOff x="0" y="0"/>
+          <a:chExt cx="0" cy="0"/>
+        </a:xfrm>
+      </p:grpSpPr>
+      <p:sp>
+        <p:nvSpPr>
+          <p:cNvPr id="11" name="Rectangle 10">
+            <a:extLst>
+              <a:ext uri="{FF2B5EF4-FFF2-40B4-BE49-F238E27FC236}">
+                <a16:creationId xmlns:a16="http://schemas.microsoft.com/office/drawing/2014/main" id="{E2264E67-6F59-4D8D-8E5F-8245B0FEAE76}"/>
+              </a:ext>
+              <a:ext uri="{C183D7F6-B498-43B3-948B-1728B52AA6E4}">
+                <adec:decorative xmlns:adec="http://schemas.microsoft.com/office/drawing/2017/decorative" val="1"/>
+              </a:ext>
+            </a:extLst>
+          </p:cNvPr>
+          <p:cNvSpPr>
+            <a:spLocks noGrp="1" noRot="1" noChangeAspect="1" noMove="1" noResize="1" noEditPoints="1" noAdjustHandles="1" noChangeArrowheads="1" noChangeShapeType="1" noTextEdit="1"/>
+          </p:cNvSpPr>
+          <p:nvPr>
+            <p:extLst>
+              <p:ext uri="{386F3935-93C4-4BCD-93E2-E3B085C9AB24}">
+                <p16:designElem xmlns:p16="http://schemas.microsoft.com/office/powerpoint/2015/main" val="1"/>
+              </p:ext>
+            </p:extLst>
+          </p:nvPr>
+        </p:nvSpPr>
+        <p:spPr>
+          <a:xfrm>
+            <a:off x="4573" y="0"/>
+            <a:ext cx="12187427" cy="6858000"/>
+          </a:xfrm>
+          <a:prstGeom prst="rect">
+            <a:avLst/>
+          </a:prstGeom>
+          <a:solidFill>
+            <a:schemeClr val="bg1"/>
+          </a:solidFill>
+          <a:ln>
+            <a:noFill/>
+          </a:ln>
+        </p:spPr>
+        <p:style>
+          <a:lnRef idx="2">
+            <a:schemeClr val="accent1">
+              <a:shade val="50000"/>
+            </a:schemeClr>
+          </a:lnRef>
+          <a:fillRef idx="1">
+            <a:schemeClr val="accent1"/>
+          </a:fillRef>
+          <a:effectRef idx="0">
+            <a:schemeClr val="accent1"/>
+          </a:effectRef>
+          <a:fontRef idx="minor">
+            <a:schemeClr val="lt1"/>
+          </a:fontRef>
+        </p:style>
+        <p:txBody>
+          <a:bodyPr rtlCol="0" anchor="ctr"/>
+          <a:lstStyle/>
+          <a:p>
+            <a:pPr algn="ctr"/>
+            <a:endParaRPr lang="en-US"/>
+          </a:p>
+        </p:txBody>
+      </p:sp>
+      <p:sp>
+        <p:nvSpPr>
+          <p:cNvPr id="13" name="Freeform 23">
+            <a:extLst>
+              <a:ext uri="{FF2B5EF4-FFF2-40B4-BE49-F238E27FC236}">
+                <a16:creationId xmlns:a16="http://schemas.microsoft.com/office/drawing/2014/main" id="{158E1C6E-D299-4F5D-B15B-155EBF7F62FD}"/>
+              </a:ext>
+              <a:ext uri="{C183D7F6-B498-43B3-948B-1728B52AA6E4}">
+                <adec:decorative xmlns:adec="http://schemas.microsoft.com/office/drawing/2017/decorative" val="1"/>
+              </a:ext>
+            </a:extLst>
+          </p:cNvPr>
+          <p:cNvSpPr>
+            <a:spLocks noGrp="1" noRot="1" noChangeAspect="1" noMove="1" noResize="1" noEditPoints="1" noAdjustHandles="1" noChangeArrowheads="1" noChangeShapeType="1" noTextEdit="1"/>
+          </p:cNvSpPr>
+          <p:nvPr>
+            <p:extLst>
+              <p:ext uri="{386F3935-93C4-4BCD-93E2-E3B085C9AB24}">
+                <p16:designElem xmlns:p16="http://schemas.microsoft.com/office/powerpoint/2015/main" val="1"/>
+              </p:ext>
+            </p:extLst>
+          </p:nvPr>
+        </p:nvSpPr>
+        <p:spPr bwMode="white">
+          <a:xfrm>
+            <a:off x="0" y="0"/>
+            <a:ext cx="4637005" cy="6858000"/>
+          </a:xfrm>
+          <a:custGeom>
+            <a:avLst/>
+            <a:gdLst>
+              <a:gd name="connsiteX0" fmla="*/ 0 w 4637005"/>
+              <a:gd name="connsiteY0" fmla="*/ 0 h 6858000"/>
+              <a:gd name="connsiteX1" fmla="*/ 4637005 w 4637005"/>
+              <a:gd name="connsiteY1" fmla="*/ 0 h 6858000"/>
+              <a:gd name="connsiteX2" fmla="*/ 4637005 w 4637005"/>
+              <a:gd name="connsiteY2" fmla="*/ 1900238 h 6858000"/>
+              <a:gd name="connsiteX3" fmla="*/ 4266589 w 4637005"/>
+              <a:gd name="connsiteY3" fmla="*/ 2178050 h 6858000"/>
+              <a:gd name="connsiteX4" fmla="*/ 4262355 w 4637005"/>
+              <a:gd name="connsiteY4" fmla="*/ 2184400 h 6858000"/>
+              <a:gd name="connsiteX5" fmla="*/ 4256005 w 4637005"/>
+              <a:gd name="connsiteY5" fmla="*/ 2193925 h 6858000"/>
+              <a:gd name="connsiteX6" fmla="*/ 4249655 w 4637005"/>
+              <a:gd name="connsiteY6" fmla="*/ 2201863 h 6858000"/>
+              <a:gd name="connsiteX7" fmla="*/ 4249655 w 4637005"/>
+              <a:gd name="connsiteY7" fmla="*/ 2211388 h 6858000"/>
+              <a:gd name="connsiteX8" fmla="*/ 4249655 w 4637005"/>
+              <a:gd name="connsiteY8" fmla="*/ 2220913 h 6858000"/>
+              <a:gd name="connsiteX9" fmla="*/ 4256005 w 4637005"/>
+              <a:gd name="connsiteY9" fmla="*/ 2228850 h 6858000"/>
+              <a:gd name="connsiteX10" fmla="*/ 4262355 w 4637005"/>
+              <a:gd name="connsiteY10" fmla="*/ 2238375 h 6858000"/>
+              <a:gd name="connsiteX11" fmla="*/ 4266589 w 4637005"/>
+              <a:gd name="connsiteY11" fmla="*/ 2244725 h 6858000"/>
+              <a:gd name="connsiteX12" fmla="*/ 4637005 w 4637005"/>
+              <a:gd name="connsiteY12" fmla="*/ 2522538 h 6858000"/>
+              <a:gd name="connsiteX13" fmla="*/ 4637005 w 4637005"/>
+              <a:gd name="connsiteY13" fmla="*/ 6858000 h 6858000"/>
+              <a:gd name="connsiteX14" fmla="*/ 0 w 4637005"/>
+              <a:gd name="connsiteY14" fmla="*/ 6858000 h 6858000"/>
+            </a:gdLst>
+            <a:ahLst/>
+            <a:cxnLst>
+              <a:cxn ang="0">
+                <a:pos x="connsiteX0" y="connsiteY0"/>
+              </a:cxn>
+              <a:cxn ang="0">
+                <a:pos x="connsiteX1" y="connsiteY1"/>
+              </a:cxn>
+              <a:cxn ang="0">
+                <a:pos x="connsiteX2" y="connsiteY2"/>
+              </a:cxn>
+              <a:cxn ang="0">
+                <a:pos x="connsiteX3" y="connsiteY3"/>
+              </a:cxn>
+              <a:cxn ang="0">
+                <a:pos x="connsiteX4" y="connsiteY4"/>
+              </a:cxn>
+              <a:cxn ang="0">
+                <a:pos x="connsiteX5" y="connsiteY5"/>
+              </a:cxn>
+              <a:cxn ang="0">
+                <a:pos x="connsiteX6" y="connsiteY6"/>
+              </a:cxn>
+              <a:cxn ang="0">
+                <a:pos x="connsiteX7" y="connsiteY7"/>
+              </a:cxn>
+              <a:cxn ang="0">
+                <a:pos x="connsiteX8" y="connsiteY8"/>
+              </a:cxn>
+              <a:cxn ang="0">
+                <a:pos x="connsiteX9" y="connsiteY9"/>
+              </a:cxn>
+              <a:cxn ang="0">
+                <a:pos x="connsiteX10" y="connsiteY10"/>
+              </a:cxn>
+              <a:cxn ang="0">
+                <a:pos x="connsiteX11" y="connsiteY11"/>
+              </a:cxn>
+              <a:cxn ang="0">
+                <a:pos x="connsiteX12" y="connsiteY12"/>
+              </a:cxn>
+              <a:cxn ang="0">
+                <a:pos x="connsiteX13" y="connsiteY13"/>
+              </a:cxn>
+              <a:cxn ang="0">
+                <a:pos x="connsiteX14" y="connsiteY14"/>
+              </a:cxn>
+            </a:cxnLst>
+            <a:rect l="l" t="t" r="r" b="b"/>
+            <a:pathLst>
+              <a:path w="4637005" h="6858000">
+                <a:moveTo>
+                  <a:pt x="0" y="0"/>
+                </a:moveTo>
+                <a:lnTo>
+                  <a:pt x="4637005" y="0"/>
+                </a:lnTo>
+                <a:lnTo>
+                  <a:pt x="4637005" y="1900238"/>
+                </a:lnTo>
+                <a:lnTo>
+                  <a:pt x="4266589" y="2178050"/>
+                </a:lnTo>
+                <a:lnTo>
+                  <a:pt x="4262355" y="2184400"/>
+                </a:lnTo>
+                <a:lnTo>
+                  <a:pt x="4256005" y="2193925"/>
+                </a:lnTo>
+                <a:lnTo>
+                  <a:pt x="4249655" y="2201863"/>
+                </a:lnTo>
+                <a:lnTo>
+                  <a:pt x="4249655" y="2211388"/>
+                </a:lnTo>
+                <a:lnTo>
+                  <a:pt x="4249655" y="2220913"/>
+                </a:lnTo>
+                <a:lnTo>
+                  <a:pt x="4256005" y="2228850"/>
+                </a:lnTo>
+                <a:lnTo>
+                  <a:pt x="4262355" y="2238375"/>
+                </a:lnTo>
+                <a:lnTo>
+                  <a:pt x="4266589" y="2244725"/>
+                </a:lnTo>
+                <a:lnTo>
+                  <a:pt x="4637005" y="2522538"/>
+                </a:lnTo>
+                <a:lnTo>
+                  <a:pt x="4637005" y="6858000"/>
+                </a:lnTo>
+                <a:lnTo>
+                  <a:pt x="0" y="6858000"/>
+                </a:lnTo>
+                <a:close/>
+              </a:path>
+            </a:pathLst>
+          </a:custGeom>
+          <a:solidFill>
+            <a:srgbClr val="212121"/>
+          </a:solidFill>
+          <a:ln>
+            <a:noFill/>
+            <a:headEnd/>
+            <a:tailEnd/>
+          </a:ln>
+        </p:spPr>
+        <p:style>
+          <a:lnRef idx="1">
+            <a:schemeClr val="accent1"/>
+          </a:lnRef>
+          <a:fillRef idx="3">
+            <a:schemeClr val="accent1"/>
+          </a:fillRef>
+          <a:effectRef idx="2">
+            <a:schemeClr val="accent1"/>
+          </a:effectRef>
+          <a:fontRef idx="minor">
+            <a:schemeClr val="lt1"/>
+          </a:fontRef>
+        </p:style>
+        <p:txBody>
+          <a:bodyPr wrap="square" rtlCol="0" anchor="ctr">
+            <a:noAutofit/>
+          </a:bodyPr>
+          <a:lstStyle/>
+          <a:p>
+            <a:pPr algn="ctr"/>
+            <a:endParaRPr lang="en-US"/>
+          </a:p>
+        </p:txBody>
+      </p:sp>
+      <p:sp>
+        <p:nvSpPr>
+          <p:cNvPr id="2" name="Naslov 1">
+            <a:extLst>
+              <a:ext uri="{FF2B5EF4-FFF2-40B4-BE49-F238E27FC236}">
+                <a16:creationId xmlns:a16="http://schemas.microsoft.com/office/drawing/2014/main" id="{9C8B6B95-E175-FCD4-F5C6-BA7BCF1CC84E}"/>
+              </a:ext>
+            </a:extLst>
+          </p:cNvPr>
+          <p:cNvSpPr>
+            <a:spLocks noGrp="1"/>
+          </p:cNvSpPr>
+          <p:nvPr>
+            <p:ph type="title"/>
+          </p:nvPr>
+        </p:nvSpPr>
+        <p:spPr>
+          <a:xfrm>
+            <a:off x="451514" y="457201"/>
+            <a:ext cx="3575737" cy="1332688"/>
+          </a:xfrm>
+        </p:spPr>
+        <p:txBody>
+          <a:bodyPr vert="horz" lIns="91440" tIns="45720" rIns="91440" bIns="45720" rtlCol="0" anchor="b">
+            <a:normAutofit/>
+          </a:bodyPr>
+          <a:lstStyle/>
+          <a:p>
+            <a:pPr algn="ctr"/>
+            <a:r>
+              <a:rPr lang="en-US" sz="3200">
+                <a:solidFill>
+                  <a:srgbClr val="FFFFFF"/>
+                </a:solidFill>
+              </a:rPr>
+              <a:t>System Architecture</a:t>
+            </a:r>
+          </a:p>
+        </p:txBody>
+      </p:sp>
+      <p:sp>
+        <p:nvSpPr>
+          <p:cNvPr id="6" name="TekstniOkvir 5">
+            <a:extLst>
+              <a:ext uri="{FF2B5EF4-FFF2-40B4-BE49-F238E27FC236}">
+                <a16:creationId xmlns:a16="http://schemas.microsoft.com/office/drawing/2014/main" id="{F1E0A0B7-ACBA-DED5-DCC3-553800AC16F6}"/>
+              </a:ext>
+            </a:extLst>
+          </p:cNvPr>
+          <p:cNvSpPr txBox="1"/>
+          <p:nvPr/>
+        </p:nvSpPr>
+        <p:spPr>
+          <a:xfrm>
+            <a:off x="451514" y="2046514"/>
+            <a:ext cx="3575737" cy="3994848"/>
+          </a:xfrm>
+          <a:prstGeom prst="rect">
+            <a:avLst/>
+          </a:prstGeom>
+        </p:spPr>
+        <p:txBody>
+          <a:bodyPr vert="horz" lIns="91440" tIns="45720" rIns="91440" bIns="45720" rtlCol="0" anchor="ctr">
+            <a:normAutofit/>
+          </a:bodyPr>
+          <a:lstStyle/>
+          <a:p>
+            <a:pPr marL="285750" indent="-285750">
+              <a:spcBef>
+                <a:spcPct val="20000"/>
+              </a:spcBef>
+              <a:spcAft>
+                <a:spcPts val="600"/>
+              </a:spcAft>
+              <a:buClr>
+                <a:schemeClr val="accent1"/>
+              </a:buClr>
+              <a:buFont typeface="Wingdings 2" charset="2"/>
+              <a:buChar char=""/>
+            </a:pPr>
+            <a:r>
+              <a:rPr lang="en-US" sz="1600">
+                <a:solidFill>
+                  <a:srgbClr val="FFFFFF"/>
+                </a:solidFill>
+              </a:rPr>
+              <a:t>Front-end</a:t>
+            </a:r>
+          </a:p>
+          <a:p>
+            <a:pPr marL="285750" indent="-285750">
+              <a:spcBef>
+                <a:spcPct val="20000"/>
+              </a:spcBef>
+              <a:spcAft>
+                <a:spcPts val="600"/>
+              </a:spcAft>
+              <a:buClr>
+                <a:schemeClr val="accent1"/>
+              </a:buClr>
+              <a:buFont typeface="Wingdings 2" charset="2"/>
+              <a:buChar char=""/>
+            </a:pPr>
+            <a:r>
+              <a:rPr lang="en-US" sz="1600">
+                <a:solidFill>
+                  <a:srgbClr val="FFFFFF"/>
+                </a:solidFill>
+              </a:rPr>
+              <a:t>Back-end</a:t>
+            </a:r>
+          </a:p>
+          <a:p>
+            <a:pPr marL="285750" indent="-285750">
+              <a:spcBef>
+                <a:spcPct val="20000"/>
+              </a:spcBef>
+              <a:spcAft>
+                <a:spcPts val="600"/>
+              </a:spcAft>
+              <a:buClr>
+                <a:schemeClr val="accent1"/>
+              </a:buClr>
+              <a:buFont typeface="Wingdings 2" charset="2"/>
+              <a:buChar char=""/>
+            </a:pPr>
+            <a:r>
+              <a:rPr lang="en-US" sz="1600">
+                <a:solidFill>
+                  <a:srgbClr val="FFFFFF"/>
+                </a:solidFill>
+              </a:rPr>
+              <a:t>Database</a:t>
+            </a:r>
+          </a:p>
+        </p:txBody>
+      </p:sp>
+      <p:pic>
+        <p:nvPicPr>
+          <p:cNvPr id="5" name="Rezervirano mjesto sadržaja 4">
+            <a:extLst>
+              <a:ext uri="{FF2B5EF4-FFF2-40B4-BE49-F238E27FC236}">
+                <a16:creationId xmlns:a16="http://schemas.microsoft.com/office/drawing/2014/main" id="{2B09BE64-F79A-EE0E-2229-1FA2740C075E}"/>
+              </a:ext>
+            </a:extLst>
+          </p:cNvPr>
+          <p:cNvPicPr>
+            <a:picLocks noGrp="1" noChangeAspect="1"/>
+          </p:cNvPicPr>
+          <p:nvPr>
+            <p:ph idx="1"/>
+          </p:nvPr>
+        </p:nvPicPr>
+        <p:blipFill>
+          <a:blip r:embed="rId2">
+            <a:extLst>
+              <a:ext uri="{28A0092B-C50C-407E-A947-70E740481C1C}">
+                <a14:useLocalDpi xmlns:a14="http://schemas.microsoft.com/office/drawing/2010/main" val="0"/>
+              </a:ext>
+            </a:extLst>
+          </a:blip>
+          <a:stretch>
+            <a:fillRect/>
+          </a:stretch>
+        </p:blipFill>
+        <p:spPr>
+          <a:xfrm>
+            <a:off x="5280790" y="1798924"/>
+            <a:ext cx="6267743" cy="2961507"/>
+          </a:xfrm>
+          <a:prstGeom prst="roundRect">
+            <a:avLst>
+              <a:gd name="adj" fmla="val 3876"/>
+            </a:avLst>
+          </a:prstGeom>
+          <a:ln>
+            <a:solidFill>
+              <a:schemeClr val="accent1"/>
+            </a:solidFill>
+          </a:ln>
+          <a:effectLst/>
+        </p:spPr>
+      </p:pic>
+    </p:spTree>
+    <p:extLst>
+      <p:ext uri="{BB962C8B-B14F-4D97-AF65-F5344CB8AC3E}">
+        <p14:creationId xmlns:p14="http://schemas.microsoft.com/office/powerpoint/2010/main" val="442564833"/>
+      </p:ext>
+    </p:extLst>
+  </p:cSld>
+  <p:clrMapOvr>
+    <a:overrideClrMapping bg1="lt1" tx1="dk1" bg2="lt2" tx2="dk2" accent1="accent1" accent2="accent2" accent3="accent3" accent4="accent4" accent5="accent5" accent6="accent6" hlink="hlink" folHlink="folHlink"/>
+  </p:clrMapOvr>
+</p:sld>
+</file>
+
+<file path=ppt/slides/slide3.xml><?xml version="1.0" encoding="utf-8"?>
+<p:sld xmlns:a="http://schemas.openxmlformats.org/drawingml/2006/main" xmlns:r="http://schemas.openxmlformats.org/officeDocument/2006/relationships" xmlns:p="http://schemas.openxmlformats.org/presentationml/2006/main">
+  <p:cSld>
+    <p:spTree>
+      <p:nvGrpSpPr>
+        <p:cNvPr id="1" name=""/>
+        <p:cNvGrpSpPr/>
+        <p:nvPr/>
+      </p:nvGrpSpPr>
+      <p:grpSpPr>
+        <a:xfrm>
+          <a:off x="0" y="0"/>
+          <a:ext cx="0" cy="0"/>
+          <a:chOff x="0" y="0"/>
+          <a:chExt cx="0" cy="0"/>
+        </a:xfrm>
+      </p:grpSpPr>
+      <p:sp>
+        <p:nvSpPr>
+          <p:cNvPr id="2" name="Naslov 1">
+            <a:extLst>
+              <a:ext uri="{FF2B5EF4-FFF2-40B4-BE49-F238E27FC236}">
+                <a16:creationId xmlns:a16="http://schemas.microsoft.com/office/drawing/2014/main" id="{944B85B9-59D6-A24A-75C3-1ADBEAB1261D}"/>
+              </a:ext>
+            </a:extLst>
+          </p:cNvPr>
+          <p:cNvSpPr>
+            <a:spLocks noGrp="1"/>
+          </p:cNvSpPr>
+          <p:nvPr>
+            <p:ph type="title"/>
+          </p:nvPr>
+        </p:nvSpPr>
+        <p:spPr/>
+        <p:txBody>
+          <a:bodyPr/>
+          <a:lstStyle/>
+          <a:p>
+            <a:r>
+              <a:rPr lang="en-US" dirty="0"/>
+              <a:t>Technologies</a:t>
+            </a:r>
+            <a:endParaRPr lang="hr-HR" dirty="0"/>
+          </a:p>
+        </p:txBody>
+      </p:sp>
+      <p:sp>
+        <p:nvSpPr>
+          <p:cNvPr id="3" name="Rezervirano mjesto sadržaja 2">
+            <a:extLst>
+              <a:ext uri="{FF2B5EF4-FFF2-40B4-BE49-F238E27FC236}">
+                <a16:creationId xmlns:a16="http://schemas.microsoft.com/office/drawing/2014/main" id="{C92B5524-D01A-AC30-2908-F256BF7DDB88}"/>
+              </a:ext>
+            </a:extLst>
+          </p:cNvPr>
+          <p:cNvSpPr>
+            <a:spLocks noGrp="1"/>
+          </p:cNvSpPr>
+          <p:nvPr>
+            <p:ph idx="1"/>
+          </p:nvPr>
+        </p:nvSpPr>
+        <p:spPr/>
+        <p:txBody>
+          <a:bodyPr/>
+          <a:lstStyle/>
+          <a:p>
+            <a:r>
+              <a:rPr lang="en-US" dirty="0"/>
+              <a:t>ReactJS</a:t>
+            </a:r>
+          </a:p>
+          <a:p>
+            <a:r>
+              <a:rPr lang="en-US" dirty="0"/>
+              <a:t>NodeJS</a:t>
+            </a:r>
+          </a:p>
+          <a:p>
+            <a:r>
+              <a:rPr lang="en-US" dirty="0" err="1"/>
+              <a:t>ExpressJS</a:t>
+            </a:r>
+            <a:endParaRPr lang="en-US" dirty="0"/>
+          </a:p>
+          <a:p>
+            <a:r>
+              <a:rPr lang="en-US" dirty="0"/>
+              <a:t>MongoDB</a:t>
+            </a:r>
+          </a:p>
+          <a:p>
+            <a:r>
+              <a:rPr lang="en-US" dirty="0"/>
+              <a:t>Mongoose</a:t>
+            </a:r>
+            <a:endParaRPr lang="hr-HR" dirty="0"/>
+          </a:p>
+        </p:txBody>
+      </p:sp>
+      <p:pic>
+        <p:nvPicPr>
+          <p:cNvPr id="5" name="Slika 4">
+            <a:extLst>
+              <a:ext uri="{FF2B5EF4-FFF2-40B4-BE49-F238E27FC236}">
+                <a16:creationId xmlns:a16="http://schemas.microsoft.com/office/drawing/2014/main" id="{5DED393D-2840-CC92-7A5A-3DE471F23A46}"/>
+              </a:ext>
+            </a:extLst>
+          </p:cNvPr>
+          <p:cNvPicPr>
+            <a:picLocks noChangeAspect="1"/>
+          </p:cNvPicPr>
+          <p:nvPr/>
+        </p:nvPicPr>
+        <p:blipFill>
+          <a:blip r:embed="rId2">
+            <a:extLst>
+              <a:ext uri="{28A0092B-C50C-407E-A947-70E740481C1C}">
+                <a14:useLocalDpi xmlns:a14="http://schemas.microsoft.com/office/drawing/2010/main" val="0"/>
+              </a:ext>
+            </a:extLst>
+          </a:blip>
+          <a:stretch>
+            <a:fillRect/>
+          </a:stretch>
+        </p:blipFill>
+        <p:spPr>
+          <a:xfrm>
+            <a:off x="5495925" y="2068733"/>
+            <a:ext cx="3676650" cy="1930241"/>
+          </a:xfrm>
+          <a:prstGeom prst="rect">
+            <a:avLst/>
+          </a:prstGeom>
+        </p:spPr>
+      </p:pic>
+      <p:pic>
+        <p:nvPicPr>
+          <p:cNvPr id="7" name="Slika 6" descr="Slika na kojoj se prikazuje tekst, isječak crteža&#10;&#10;Opis je automatski generiran">
+            <a:extLst>
+              <a:ext uri="{FF2B5EF4-FFF2-40B4-BE49-F238E27FC236}">
+                <a16:creationId xmlns:a16="http://schemas.microsoft.com/office/drawing/2014/main" id="{C2D7B496-4F47-467D-2CC6-C4E2D2681D55}"/>
+              </a:ext>
+            </a:extLst>
+          </p:cNvPr>
+          <p:cNvPicPr>
+            <a:picLocks noChangeAspect="1"/>
+          </p:cNvPicPr>
+          <p:nvPr/>
+        </p:nvPicPr>
+        <p:blipFill>
+          <a:blip r:embed="rId3">
+            <a:extLst>
+              <a:ext uri="{28A0092B-C50C-407E-A947-70E740481C1C}">
+                <a14:useLocalDpi xmlns:a14="http://schemas.microsoft.com/office/drawing/2010/main" val="0"/>
+              </a:ext>
+            </a:extLst>
+          </a:blip>
+          <a:stretch>
+            <a:fillRect/>
+          </a:stretch>
+        </p:blipFill>
+        <p:spPr>
+          <a:xfrm>
+            <a:off x="8848725" y="3398949"/>
+            <a:ext cx="2653481" cy="1114462"/>
+          </a:xfrm>
+          <a:prstGeom prst="rect">
+            <a:avLst/>
+          </a:prstGeom>
+        </p:spPr>
+      </p:pic>
+      <p:pic>
+        <p:nvPicPr>
+          <p:cNvPr id="9" name="Slika 8">
+            <a:extLst>
+              <a:ext uri="{FF2B5EF4-FFF2-40B4-BE49-F238E27FC236}">
+                <a16:creationId xmlns:a16="http://schemas.microsoft.com/office/drawing/2014/main" id="{88A95A44-014C-4F4B-7358-7F96DB8CF89F}"/>
+              </a:ext>
+            </a:extLst>
+          </p:cNvPr>
+          <p:cNvPicPr>
+            <a:picLocks noChangeAspect="1"/>
+          </p:cNvPicPr>
+          <p:nvPr/>
+        </p:nvPicPr>
+        <p:blipFill>
+          <a:blip r:embed="rId4">
+            <a:extLst>
+              <a:ext uri="{28A0092B-C50C-407E-A947-70E740481C1C}">
+                <a14:useLocalDpi xmlns:a14="http://schemas.microsoft.com/office/drawing/2010/main" val="0"/>
+              </a:ext>
+            </a:extLst>
+          </a:blip>
+          <a:stretch>
+            <a:fillRect/>
+          </a:stretch>
+        </p:blipFill>
+        <p:spPr>
+          <a:xfrm>
+            <a:off x="7753350" y="5170383"/>
+            <a:ext cx="3514725" cy="947328"/>
+          </a:xfrm>
+          <a:prstGeom prst="rect">
+            <a:avLst/>
+          </a:prstGeom>
+        </p:spPr>
+      </p:pic>
+      <p:pic>
+        <p:nvPicPr>
+          <p:cNvPr id="11" name="Slika 10">
+            <a:extLst>
+              <a:ext uri="{FF2B5EF4-FFF2-40B4-BE49-F238E27FC236}">
+                <a16:creationId xmlns:a16="http://schemas.microsoft.com/office/drawing/2014/main" id="{3D6B121F-492F-7816-7EA3-529F9EC4FF9D}"/>
+              </a:ext>
+            </a:extLst>
+          </p:cNvPr>
+          <p:cNvPicPr>
+            <a:picLocks noChangeAspect="1"/>
+          </p:cNvPicPr>
+          <p:nvPr/>
+        </p:nvPicPr>
+        <p:blipFill>
+          <a:blip r:embed="rId5">
+            <a:extLst>
+              <a:ext uri="{28A0092B-C50C-407E-A947-70E740481C1C}">
+                <a14:useLocalDpi xmlns:a14="http://schemas.microsoft.com/office/drawing/2010/main" val="0"/>
+              </a:ext>
+            </a:extLst>
+          </a:blip>
+          <a:stretch>
+            <a:fillRect/>
+          </a:stretch>
+        </p:blipFill>
+        <p:spPr>
+          <a:xfrm>
+            <a:off x="5282105" y="3965117"/>
+            <a:ext cx="2302835" cy="1096588"/>
+          </a:xfrm>
+          <a:prstGeom prst="rect">
+            <a:avLst/>
+          </a:prstGeom>
+        </p:spPr>
+      </p:pic>
+    </p:spTree>
+    <p:extLst>
+      <p:ext uri="{BB962C8B-B14F-4D97-AF65-F5344CB8AC3E}">
+        <p14:creationId xmlns:p14="http://schemas.microsoft.com/office/powerpoint/2010/main" val="1791875623"/>
+      </p:ext>
+    </p:extLst>
+  </p:cSld>
+  <p:clrMapOvr>
+    <a:masterClrMapping/>
+  </p:clrMapOvr>
+</p:sld>
+</file>
+
+<file path=ppt/slides/slide4.xml><?xml version="1.0" encoding="utf-8"?>
+<p:sld xmlns:a="http://schemas.openxmlformats.org/drawingml/2006/main" xmlns:r="http://schemas.openxmlformats.org/officeDocument/2006/relationships" xmlns:p="http://schemas.openxmlformats.org/presentationml/2006/main">
+  <p:cSld>
+    <p:bg>
+      <p:bgPr>
+        <a:solidFill>
           <a:schemeClr val="bg2"/>
         </a:solidFill>
         <a:effectLst/>
@@ -8128,6 +10189,260 @@
           <p:cNvPr id="2" name="Naslov 1">
             <a:extLst>
               <a:ext uri="{FF2B5EF4-FFF2-40B4-BE49-F238E27FC236}">
+                <a16:creationId xmlns:a16="http://schemas.microsoft.com/office/drawing/2014/main" id="{0A422BB7-1962-C962-52B9-5F5B462297E5}"/>
+              </a:ext>
+            </a:extLst>
+          </p:cNvPr>
+          <p:cNvSpPr>
+            <a:spLocks noGrp="1"/>
+          </p:cNvSpPr>
+          <p:nvPr>
+            <p:ph type="title"/>
+          </p:nvPr>
+        </p:nvSpPr>
+        <p:spPr>
+          <a:xfrm>
+            <a:off x="810000" y="447188"/>
+            <a:ext cx="10571998" cy="970450"/>
+          </a:xfrm>
+        </p:spPr>
+        <p:txBody>
+          <a:bodyPr>
+            <a:normAutofit/>
+          </a:bodyPr>
+          <a:lstStyle/>
+          <a:p>
+            <a:r>
+              <a:rPr lang="en-US" dirty="0"/>
+              <a:t>Database</a:t>
+            </a:r>
+            <a:endParaRPr lang="hr-HR" dirty="0"/>
+          </a:p>
+        </p:txBody>
+      </p:sp>
+      <p:sp>
+        <p:nvSpPr>
+          <p:cNvPr id="3" name="Rezervirano mjesto sadržaja 2">
+            <a:extLst>
+              <a:ext uri="{FF2B5EF4-FFF2-40B4-BE49-F238E27FC236}">
+                <a16:creationId xmlns:a16="http://schemas.microsoft.com/office/drawing/2014/main" id="{99B6F123-9CE3-4C0D-0CED-87F5E0B3FD9E}"/>
+              </a:ext>
+            </a:extLst>
+          </p:cNvPr>
+          <p:cNvSpPr>
+            <a:spLocks noGrp="1"/>
+          </p:cNvSpPr>
+          <p:nvPr>
+            <p:ph idx="1"/>
+          </p:nvPr>
+        </p:nvSpPr>
+        <p:spPr>
+          <a:xfrm>
+            <a:off x="818714" y="2413000"/>
+            <a:ext cx="5277286" cy="3632200"/>
+          </a:xfrm>
+        </p:spPr>
+        <p:txBody>
+          <a:bodyPr>
+            <a:normAutofit/>
+          </a:bodyPr>
+          <a:lstStyle/>
+          <a:p>
+            <a:r>
+              <a:rPr lang="en-US" dirty="0"/>
+              <a:t>NoSQL</a:t>
+            </a:r>
+          </a:p>
+          <a:p>
+            <a:r>
+              <a:rPr lang="en-US" dirty="0"/>
+              <a:t>MongoDB and Mongoose</a:t>
+            </a:r>
+          </a:p>
+          <a:p>
+            <a:r>
+              <a:rPr lang="en-US" dirty="0"/>
+              <a:t>Users, Events and Ratings</a:t>
+            </a:r>
+            <a:endParaRPr lang="hr-HR" dirty="0"/>
+          </a:p>
+        </p:txBody>
+      </p:sp>
+      <p:pic>
+        <p:nvPicPr>
+          <p:cNvPr id="5" name="Slika 4" descr="Slika na kojoj se prikazuje tekst&#10;&#10;Opis je automatski generiran">
+            <a:extLst>
+              <a:ext uri="{FF2B5EF4-FFF2-40B4-BE49-F238E27FC236}">
+                <a16:creationId xmlns:a16="http://schemas.microsoft.com/office/drawing/2014/main" id="{9CE7607C-8E45-3CB9-FB43-F0CD8431776A}"/>
+              </a:ext>
+            </a:extLst>
+          </p:cNvPr>
+          <p:cNvPicPr>
+            <a:picLocks noChangeAspect="1"/>
+          </p:cNvPicPr>
+          <p:nvPr/>
+        </p:nvPicPr>
+        <p:blipFill>
+          <a:blip r:embed="rId2">
+            <a:extLst>
+              <a:ext uri="{28A0092B-C50C-407E-A947-70E740481C1C}">
+                <a14:useLocalDpi xmlns:a14="http://schemas.microsoft.com/office/drawing/2010/main" val="0"/>
+              </a:ext>
+            </a:extLst>
+          </a:blip>
+          <a:stretch>
+            <a:fillRect/>
+          </a:stretch>
+        </p:blipFill>
+        <p:spPr>
+          <a:xfrm>
+            <a:off x="8931565" y="2176390"/>
+            <a:ext cx="2441722" cy="2774286"/>
+          </a:xfrm>
+          <a:prstGeom prst="roundRect">
+            <a:avLst>
+              <a:gd name="adj" fmla="val 3876"/>
+            </a:avLst>
+          </a:prstGeom>
+          <a:ln>
+            <a:solidFill>
+              <a:schemeClr val="accent1"/>
+            </a:solidFill>
+          </a:ln>
+          <a:effectLst/>
+        </p:spPr>
+      </p:pic>
+      <p:pic>
+        <p:nvPicPr>
+          <p:cNvPr id="9" name="Slika 8" descr="Slika na kojoj se prikazuje tekst&#10;&#10;Opis je automatski generiran">
+            <a:extLst>
+              <a:ext uri="{FF2B5EF4-FFF2-40B4-BE49-F238E27FC236}">
+                <a16:creationId xmlns:a16="http://schemas.microsoft.com/office/drawing/2014/main" id="{B131CDE5-162C-E7D2-A13A-FC112B5D6B25}"/>
+              </a:ext>
+            </a:extLst>
+          </p:cNvPr>
+          <p:cNvPicPr>
+            <a:picLocks noChangeAspect="1"/>
+          </p:cNvPicPr>
+          <p:nvPr/>
+        </p:nvPicPr>
+        <p:blipFill>
+          <a:blip r:embed="rId3">
+            <a:extLst>
+              <a:ext uri="{28A0092B-C50C-407E-A947-70E740481C1C}">
+                <a14:useLocalDpi xmlns:a14="http://schemas.microsoft.com/office/drawing/2010/main" val="0"/>
+              </a:ext>
+            </a:extLst>
+          </a:blip>
+          <a:stretch>
+            <a:fillRect/>
+          </a:stretch>
+        </p:blipFill>
+        <p:spPr>
+          <a:xfrm>
+            <a:off x="5280385" y="2175052"/>
+            <a:ext cx="3416983" cy="2505219"/>
+          </a:xfrm>
+          <a:prstGeom prst="roundRect">
+            <a:avLst>
+              <a:gd name="adj" fmla="val 3876"/>
+            </a:avLst>
+          </a:prstGeom>
+          <a:ln>
+            <a:solidFill>
+              <a:schemeClr val="accent1"/>
+            </a:solidFill>
+          </a:ln>
+          <a:effectLst/>
+        </p:spPr>
+      </p:pic>
+      <p:pic>
+        <p:nvPicPr>
+          <p:cNvPr id="7" name="Slika 6" descr="Slika na kojoj se prikazuje tekst&#10;&#10;Opis je automatski generiran">
+            <a:extLst>
+              <a:ext uri="{FF2B5EF4-FFF2-40B4-BE49-F238E27FC236}">
+                <a16:creationId xmlns:a16="http://schemas.microsoft.com/office/drawing/2014/main" id="{8F02BB37-484D-6BCD-CEBD-E5A3CA24E7E5}"/>
+              </a:ext>
+            </a:extLst>
+          </p:cNvPr>
+          <p:cNvPicPr>
+            <a:picLocks noChangeAspect="1"/>
+          </p:cNvPicPr>
+          <p:nvPr/>
+        </p:nvPicPr>
+        <p:blipFill>
+          <a:blip r:embed="rId4">
+            <a:extLst>
+              <a:ext uri="{28A0092B-C50C-407E-A947-70E740481C1C}">
+                <a14:useLocalDpi xmlns:a14="http://schemas.microsoft.com/office/drawing/2010/main" val="0"/>
+              </a:ext>
+            </a:extLst>
+          </a:blip>
+          <a:stretch>
+            <a:fillRect/>
+          </a:stretch>
+        </p:blipFill>
+        <p:spPr>
+          <a:xfrm>
+            <a:off x="6106345" y="5306544"/>
+            <a:ext cx="3761413" cy="1104268"/>
+          </a:xfrm>
+          <a:prstGeom prst="roundRect">
+            <a:avLst>
+              <a:gd name="adj" fmla="val 3876"/>
+            </a:avLst>
+          </a:prstGeom>
+          <a:ln>
+            <a:solidFill>
+              <a:schemeClr val="accent1"/>
+            </a:solidFill>
+          </a:ln>
+          <a:effectLst/>
+        </p:spPr>
+      </p:pic>
+    </p:spTree>
+    <p:extLst>
+      <p:ext uri="{BB962C8B-B14F-4D97-AF65-F5344CB8AC3E}">
+        <p14:creationId xmlns:p14="http://schemas.microsoft.com/office/powerpoint/2010/main" val="45897920"/>
+      </p:ext>
+    </p:extLst>
+  </p:cSld>
+  <p:clrMapOvr>
+    <a:masterClrMapping/>
+  </p:clrMapOvr>
+</p:sld>
+</file>
+
+<file path=ppt/slides/slide5.xml><?xml version="1.0" encoding="utf-8"?>
+<p:sld xmlns:a="http://schemas.openxmlformats.org/drawingml/2006/main" xmlns:r="http://schemas.openxmlformats.org/officeDocument/2006/relationships" xmlns:p="http://schemas.openxmlformats.org/presentationml/2006/main">
+  <p:cSld>
+    <p:bg>
+      <p:bgPr>
+        <a:solidFill>
+          <a:schemeClr val="bg2"/>
+        </a:solidFill>
+        <a:effectLst/>
+      </p:bgPr>
+    </p:bg>
+    <p:spTree>
+      <p:nvGrpSpPr>
+        <p:cNvPr id="1" name=""/>
+        <p:cNvGrpSpPr/>
+        <p:nvPr/>
+      </p:nvGrpSpPr>
+      <p:grpSpPr>
+        <a:xfrm>
+          <a:off x="0" y="0"/>
+          <a:ext cx="0" cy="0"/>
+          <a:chOff x="0" y="0"/>
+          <a:chExt cx="0" cy="0"/>
+        </a:xfrm>
+      </p:grpSpPr>
+      <p:sp>
+        <p:nvSpPr>
+          <p:cNvPr id="2" name="Naslov 1">
+            <a:extLst>
+              <a:ext uri="{FF2B5EF4-FFF2-40B4-BE49-F238E27FC236}">
                 <a16:creationId xmlns:a16="http://schemas.microsoft.com/office/drawing/2014/main" id="{E64CDBC6-4EFF-FA9C-EA27-73764CACE314}"/>
               </a:ext>
             </a:extLst>
@@ -8146,15 +10461,7 @@
           <a:p>
             <a:r>
               <a:rPr lang="en-US" dirty="0"/>
-              <a:t>What is </a:t>
-            </a:r>
-            <a:r>
-              <a:rPr lang="en-US" dirty="0" err="1"/>
-              <a:t>SportEve</a:t>
-            </a:r>
-            <a:r>
-              <a:rPr lang="en-US" dirty="0"/>
-              <a:t>?</a:t>
+              <a:t>Main functionalities</a:t>
             </a:r>
             <a:endParaRPr lang="hr-HR" dirty="0"/>
           </a:p>
@@ -8176,15 +10483,52 @@
             <p:ph idx="1"/>
           </p:nvPr>
         </p:nvSpPr>
-        <p:spPr/>
+        <p:spPr>
+          <a:xfrm>
+            <a:off x="810000" y="2610214"/>
+            <a:ext cx="10554574" cy="3636511"/>
+          </a:xfrm>
+        </p:spPr>
         <p:txBody>
           <a:bodyPr/>
           <a:lstStyle/>
           <a:p>
             <a:r>
-              <a:rPr lang="en-US"/>
-              <a:t>Main features?</a:t>
-            </a:r>
+              <a:rPr lang="en-US" sz="2400" dirty="0"/>
+              <a:t>Registration/Log-in</a:t>
+            </a:r>
+          </a:p>
+          <a:p>
+            <a:r>
+              <a:rPr lang="en-US" sz="2400" dirty="0"/>
+              <a:t>Event exploration</a:t>
+            </a:r>
+          </a:p>
+          <a:p>
+            <a:r>
+              <a:rPr lang="en-US" sz="2400" dirty="0"/>
+              <a:t>Creating a new event</a:t>
+            </a:r>
+          </a:p>
+          <a:p>
+            <a:r>
+              <a:rPr lang="en-US" sz="2400" dirty="0"/>
+              <a:t>Managing your event</a:t>
+            </a:r>
+          </a:p>
+          <a:p>
+            <a:r>
+              <a:rPr lang="en-US" sz="2400" dirty="0"/>
+              <a:t>Joining/canceling events</a:t>
+            </a:r>
+          </a:p>
+          <a:p>
+            <a:r>
+              <a:rPr lang="en-US" sz="2400" dirty="0"/>
+              <a:t>Viewing profiles</a:t>
+            </a:r>
+          </a:p>
+          <a:p>
             <a:endParaRPr lang="en-US" dirty="0"/>
           </a:p>
           <a:p>
@@ -8195,6 +10539,78 @@
           </a:p>
         </p:txBody>
       </p:sp>
+      <p:pic>
+        <p:nvPicPr>
+          <p:cNvPr id="5" name="Slika 4">
+            <a:extLst>
+              <a:ext uri="{FF2B5EF4-FFF2-40B4-BE49-F238E27FC236}">
+                <a16:creationId xmlns:a16="http://schemas.microsoft.com/office/drawing/2014/main" id="{C27BC1F8-C4DA-92D2-9A28-81FC153FAE31}"/>
+              </a:ext>
+            </a:extLst>
+          </p:cNvPr>
+          <p:cNvPicPr>
+            <a:picLocks noChangeAspect="1"/>
+          </p:cNvPicPr>
+          <p:nvPr/>
+        </p:nvPicPr>
+        <p:blipFill>
+          <a:blip r:embed="rId2">
+            <a:extLst>
+              <a:ext uri="{28A0092B-C50C-407E-A947-70E740481C1C}">
+                <a14:useLocalDpi xmlns:a14="http://schemas.microsoft.com/office/drawing/2010/main" val="0"/>
+              </a:ext>
+            </a:extLst>
+          </a:blip>
+          <a:stretch>
+            <a:fillRect/>
+          </a:stretch>
+        </p:blipFill>
+        <p:spPr>
+          <a:xfrm>
+            <a:off x="6309961" y="2178001"/>
+            <a:ext cx="4762913" cy="3795089"/>
+          </a:xfrm>
+          <a:prstGeom prst="rect">
+            <a:avLst/>
+          </a:prstGeom>
+        </p:spPr>
+      </p:pic>
+      <p:pic>
+        <p:nvPicPr>
+          <p:cNvPr id="7" name="Slika 6">
+            <a:extLst>
+              <a:ext uri="{FF2B5EF4-FFF2-40B4-BE49-F238E27FC236}">
+                <a16:creationId xmlns:a16="http://schemas.microsoft.com/office/drawing/2014/main" id="{7388BCB8-35CA-9F20-23A5-7B8BA8E6EF4B}"/>
+              </a:ext>
+            </a:extLst>
+          </p:cNvPr>
+          <p:cNvPicPr>
+            <a:picLocks noChangeAspect="1"/>
+          </p:cNvPicPr>
+          <p:nvPr/>
+        </p:nvPicPr>
+        <p:blipFill>
+          <a:blip r:embed="rId3">
+            <a:extLst>
+              <a:ext uri="{28A0092B-C50C-407E-A947-70E740481C1C}">
+                <a14:useLocalDpi xmlns:a14="http://schemas.microsoft.com/office/drawing/2010/main" val="0"/>
+              </a:ext>
+            </a:extLst>
+          </a:blip>
+          <a:stretch>
+            <a:fillRect/>
+          </a:stretch>
+        </p:blipFill>
+        <p:spPr>
+          <a:xfrm>
+            <a:off x="6954337" y="2178001"/>
+            <a:ext cx="4343562" cy="4059900"/>
+          </a:xfrm>
+          <a:prstGeom prst="rect">
+            <a:avLst/>
+          </a:prstGeom>
+        </p:spPr>
+      </p:pic>
     </p:spTree>
     <p:extLst>
       <p:ext uri="{BB962C8B-B14F-4D97-AF65-F5344CB8AC3E}">
@@ -8205,10 +10621,157 @@
   <p:clrMapOvr>
     <a:masterClrMapping/>
   </p:clrMapOvr>
+  <p:timing>
+    <p:tnLst>
+      <p:par>
+        <p:cTn id="1" dur="indefinite" restart="never" nodeType="tmRoot">
+          <p:childTnLst>
+            <p:seq concurrent="1" nextAc="seek">
+              <p:cTn id="2" dur="indefinite" nodeType="mainSeq">
+                <p:childTnLst>
+                  <p:par>
+                    <p:cTn id="3" fill="hold">
+                      <p:stCondLst>
+                        <p:cond delay="indefinite"/>
+                      </p:stCondLst>
+                      <p:childTnLst>
+                        <p:par>
+                          <p:cTn id="4" fill="hold">
+                            <p:stCondLst>
+                              <p:cond delay="0"/>
+                            </p:stCondLst>
+                            <p:childTnLst>
+                              <p:par>
+                                <p:cTn id="5" presetID="1" presetClass="entr" presetSubtype="0" fill="hold" nodeType="clickEffect">
+                                  <p:stCondLst>
+                                    <p:cond delay="0"/>
+                                  </p:stCondLst>
+                                  <p:childTnLst>
+                                    <p:set>
+                                      <p:cBhvr>
+                                        <p:cTn id="6" dur="1" fill="hold">
+                                          <p:stCondLst>
+                                            <p:cond delay="0"/>
+                                          </p:stCondLst>
+                                        </p:cTn>
+                                        <p:tgtEl>
+                                          <p:spTgt spid="5"/>
+                                        </p:tgtEl>
+                                        <p:attrNameLst>
+                                          <p:attrName>style.visibility</p:attrName>
+                                        </p:attrNameLst>
+                                      </p:cBhvr>
+                                      <p:to>
+                                        <p:strVal val="visible"/>
+                                      </p:to>
+                                    </p:set>
+                                  </p:childTnLst>
+                                </p:cTn>
+                              </p:par>
+                            </p:childTnLst>
+                          </p:cTn>
+                        </p:par>
+                      </p:childTnLst>
+                    </p:cTn>
+                  </p:par>
+                  <p:par>
+                    <p:cTn id="7" fill="hold">
+                      <p:stCondLst>
+                        <p:cond delay="indefinite"/>
+                      </p:stCondLst>
+                      <p:childTnLst>
+                        <p:par>
+                          <p:cTn id="8" fill="hold">
+                            <p:stCondLst>
+                              <p:cond delay="0"/>
+                            </p:stCondLst>
+                            <p:childTnLst>
+                              <p:par>
+                                <p:cTn id="9" presetID="1" presetClass="exit" presetSubtype="0" fill="hold" nodeType="clickEffect">
+                                  <p:stCondLst>
+                                    <p:cond delay="0"/>
+                                  </p:stCondLst>
+                                  <p:childTnLst>
+                                    <p:set>
+                                      <p:cBhvr>
+                                        <p:cTn id="10" dur="1" fill="hold">
+                                          <p:stCondLst>
+                                            <p:cond delay="0"/>
+                                          </p:stCondLst>
+                                        </p:cTn>
+                                        <p:tgtEl>
+                                          <p:spTgt spid="5"/>
+                                        </p:tgtEl>
+                                        <p:attrNameLst>
+                                          <p:attrName>style.visibility</p:attrName>
+                                        </p:attrNameLst>
+                                      </p:cBhvr>
+                                      <p:to>
+                                        <p:strVal val="hidden"/>
+                                      </p:to>
+                                    </p:set>
+                                  </p:childTnLst>
+                                </p:cTn>
+                              </p:par>
+                              <p:par>
+                                <p:cTn id="11" presetID="1" presetClass="entr" presetSubtype="0" fill="hold" nodeType="withEffect">
+                                  <p:stCondLst>
+                                    <p:cond delay="0"/>
+                                  </p:stCondLst>
+                                  <p:childTnLst>
+                                    <p:set>
+                                      <p:cBhvr>
+                                        <p:cTn id="12" dur="1" fill="hold">
+                                          <p:stCondLst>
+                                            <p:cond delay="0"/>
+                                          </p:stCondLst>
+                                        </p:cTn>
+                                        <p:tgtEl>
+                                          <p:spTgt spid="7"/>
+                                        </p:tgtEl>
+                                        <p:attrNameLst>
+                                          <p:attrName>style.visibility</p:attrName>
+                                        </p:attrNameLst>
+                                      </p:cBhvr>
+                                      <p:to>
+                                        <p:strVal val="visible"/>
+                                      </p:to>
+                                    </p:set>
+                                  </p:childTnLst>
+                                </p:cTn>
+                              </p:par>
+                            </p:childTnLst>
+                          </p:cTn>
+                        </p:par>
+                      </p:childTnLst>
+                    </p:cTn>
+                  </p:par>
+                </p:childTnLst>
+              </p:cTn>
+              <p:prevCondLst>
+                <p:cond evt="onPrev" delay="0">
+                  <p:tgtEl>
+                    <p:sldTgt/>
+                  </p:tgtEl>
+                </p:cond>
+              </p:prevCondLst>
+              <p:nextCondLst>
+                <p:cond evt="onNext" delay="0">
+                  <p:tgtEl>
+                    <p:sldTgt/>
+                  </p:tgtEl>
+                </p:cond>
+              </p:nextCondLst>
+            </p:seq>
+          </p:childTnLst>
+        </p:cTn>
+      </p:par>
+    </p:tnLst>
+  </p:timing>
 </p:sld>
 </file>
 
-<file path=ppt/slides/slide3.xml><?xml version="1.0" encoding="utf-8"?>
+<file path=ppt/slides/slide6.xml><?xml version="1.0" encoding="utf-8"?>
 <p:sld xmlns:a="http://schemas.openxmlformats.org/drawingml/2006/main" xmlns:r="http://schemas.openxmlformats.org/officeDocument/2006/relationships" xmlns:p="http://schemas.openxmlformats.org/presentationml/2006/main">
   <p:cSld>
     <p:spTree>
@@ -8485,7 +11048,7 @@
 </p:sld>
 </file>
 
-<file path=ppt/slides/slide4.xml><?xml version="1.0" encoding="utf-8"?>
+<file path=ppt/slides/slide7.xml><?xml version="1.0" encoding="utf-8"?>
 <p:sld xmlns:a="http://schemas.openxmlformats.org/drawingml/2006/main" xmlns:r="http://schemas.openxmlformats.org/officeDocument/2006/relationships" xmlns:p="http://schemas.openxmlformats.org/presentationml/2006/main">
   <p:cSld>
     <p:bg>
@@ -9102,7 +11665,7 @@
 </p:sld>
 </file>
 
-<file path=ppt/slides/slide5.xml><?xml version="1.0" encoding="utf-8"?>
+<file path=ppt/slides/slide8.xml><?xml version="1.0" encoding="utf-8"?>
 <p:sld xmlns:a="http://schemas.openxmlformats.org/drawingml/2006/main" xmlns:r="http://schemas.openxmlformats.org/officeDocument/2006/relationships" xmlns:p="http://schemas.openxmlformats.org/presentationml/2006/main">
   <p:cSld>
     <p:bg>
@@ -9680,7 +12243,7 @@
 </p:sld>
 </file>
 
-<file path=ppt/slides/slide6.xml><?xml version="1.0" encoding="utf-8"?>
+<file path=ppt/slides/slide9.xml><?xml version="1.0" encoding="utf-8"?>
 <p:sld xmlns:a="http://schemas.openxmlformats.org/drawingml/2006/main" xmlns:r="http://schemas.openxmlformats.org/officeDocument/2006/relationships" xmlns:p="http://schemas.openxmlformats.org/presentationml/2006/main">
   <p:cSld>
     <p:spTree>
@@ -9909,1313 +12472,6 @@
       </p:par>
     </p:tnLst>
   </p:timing>
-</p:sld>
-</file>
-
-<file path=ppt/slides/slide7.xml><?xml version="1.0" encoding="utf-8"?>
-<p:sld xmlns:a="http://schemas.openxmlformats.org/drawingml/2006/main" xmlns:r="http://schemas.openxmlformats.org/officeDocument/2006/relationships" xmlns:p="http://schemas.openxmlformats.org/presentationml/2006/main">
-  <p:cSld>
-    <p:bg>
-      <p:bgPr>
-        <a:solidFill>
-          <a:schemeClr val="bg1"/>
-        </a:solidFill>
-        <a:effectLst/>
-      </p:bgPr>
-    </p:bg>
-    <p:spTree>
-      <p:nvGrpSpPr>
-        <p:cNvPr id="1" name=""/>
-        <p:cNvGrpSpPr/>
-        <p:nvPr/>
-      </p:nvGrpSpPr>
-      <p:grpSpPr>
-        <a:xfrm>
-          <a:off x="0" y="0"/>
-          <a:ext cx="0" cy="0"/>
-          <a:chOff x="0" y="0"/>
-          <a:chExt cx="0" cy="0"/>
-        </a:xfrm>
-      </p:grpSpPr>
-      <p:sp>
-        <p:nvSpPr>
-          <p:cNvPr id="21" name="Freeform 6">
-            <a:extLst>
-              <a:ext uri="{FF2B5EF4-FFF2-40B4-BE49-F238E27FC236}">
-                <a16:creationId xmlns:a16="http://schemas.microsoft.com/office/drawing/2014/main" id="{133F8CB7-795C-4272-9073-64D8CF97F220}"/>
-              </a:ext>
-              <a:ext uri="{C183D7F6-B498-43B3-948B-1728B52AA6E4}">
-                <adec:decorative xmlns:adec="http://schemas.microsoft.com/office/drawing/2017/decorative" val="1"/>
-              </a:ext>
-            </a:extLst>
-          </p:cNvPr>
-          <p:cNvSpPr>
-            <a:spLocks noGrp="1" noRot="1" noChangeAspect="1" noMove="1" noResize="1" noEditPoints="1" noAdjustHandles="1" noChangeArrowheads="1" noChangeShapeType="1" noTextEdit="1"/>
-          </p:cNvSpPr>
-          <p:nvPr>
-            <p:extLst>
-              <p:ext uri="{386F3935-93C4-4BCD-93E2-E3B085C9AB24}">
-                <p16:designElem xmlns:p16="http://schemas.microsoft.com/office/powerpoint/2015/main" val="1"/>
-              </p:ext>
-            </p:extLst>
-          </p:nvPr>
-        </p:nvSpPr>
-        <p:spPr bwMode="auto">
-          <a:xfrm>
-            <a:off x="0" y="-3175"/>
-            <a:ext cx="12192000" cy="5203825"/>
-          </a:xfrm>
-          <a:custGeom>
-            <a:avLst/>
-            <a:gdLst/>
-            <a:ahLst/>
-            <a:cxnLst/>
-            <a:rect l="0" t="0" r="r" b="b"/>
-            <a:pathLst>
-              <a:path w="5760" h="3278">
-                <a:moveTo>
-                  <a:pt x="5760" y="0"/>
-                </a:moveTo>
-                <a:lnTo>
-                  <a:pt x="0" y="0"/>
-                </a:lnTo>
-                <a:lnTo>
-                  <a:pt x="0" y="3090"/>
-                </a:lnTo>
-                <a:lnTo>
-                  <a:pt x="943" y="3090"/>
-                </a:lnTo>
-                <a:lnTo>
-                  <a:pt x="1123" y="3270"/>
-                </a:lnTo>
-                <a:lnTo>
-                  <a:pt x="1123" y="3270"/>
-                </a:lnTo>
-                <a:lnTo>
-                  <a:pt x="1127" y="3272"/>
-                </a:lnTo>
-                <a:lnTo>
-                  <a:pt x="1133" y="3275"/>
-                </a:lnTo>
-                <a:lnTo>
-                  <a:pt x="1139" y="3278"/>
-                </a:lnTo>
-                <a:lnTo>
-                  <a:pt x="1144" y="3278"/>
-                </a:lnTo>
-                <a:lnTo>
-                  <a:pt x="1150" y="3278"/>
-                </a:lnTo>
-                <a:lnTo>
-                  <a:pt x="1155" y="3275"/>
-                </a:lnTo>
-                <a:lnTo>
-                  <a:pt x="1161" y="3272"/>
-                </a:lnTo>
-                <a:lnTo>
-                  <a:pt x="1165" y="3270"/>
-                </a:lnTo>
-                <a:lnTo>
-                  <a:pt x="1345" y="3090"/>
-                </a:lnTo>
-                <a:lnTo>
-                  <a:pt x="5760" y="3090"/>
-                </a:lnTo>
-                <a:lnTo>
-                  <a:pt x="5760" y="0"/>
-                </a:lnTo>
-                <a:close/>
-              </a:path>
-            </a:pathLst>
-          </a:custGeom>
-          <a:ln/>
-          <a:effectLst/>
-          <a:extLst>
-            <a:ext uri="{91240B29-F687-4f45-9708-019B960494DF}">
-              <a14:hiddenLine xmlns:a14="http://schemas.microsoft.com/office/drawing/2010/main" xmlns:p14="http://schemas.microsoft.com/office/powerpoint/2010/main" xmlns:a16="http://schemas.microsoft.com/office/drawing/2014/main" xmlns="" w="9525">
-                <a:solidFill>
-                  <a:srgbClr val="000000"/>
-                </a:solidFill>
-                <a:round/>
-                <a:headEnd/>
-                <a:tailEnd/>
-              </a14:hiddenLine>
-            </a:ext>
-          </a:extLst>
-        </p:spPr>
-        <p:style>
-          <a:lnRef idx="1">
-            <a:schemeClr val="accent1"/>
-          </a:lnRef>
-          <a:fillRef idx="3">
-            <a:schemeClr val="accent1"/>
-          </a:fillRef>
-          <a:effectRef idx="2">
-            <a:schemeClr val="accent1"/>
-          </a:effectRef>
-          <a:fontRef idx="minor">
-            <a:schemeClr val="lt1"/>
-          </a:fontRef>
-        </p:style>
-      </p:sp>
-      <p:sp>
-        <p:nvSpPr>
-          <p:cNvPr id="23" name="Rectangle 22">
-            <a:extLst>
-              <a:ext uri="{FF2B5EF4-FFF2-40B4-BE49-F238E27FC236}">
-                <a16:creationId xmlns:a16="http://schemas.microsoft.com/office/drawing/2014/main" id="{B7743172-17A8-4FA4-8434-B813E03B7665}"/>
-              </a:ext>
-              <a:ext uri="{C183D7F6-B498-43B3-948B-1728B52AA6E4}">
-                <adec:decorative xmlns:adec="http://schemas.microsoft.com/office/drawing/2017/decorative" val="1"/>
-              </a:ext>
-            </a:extLst>
-          </p:cNvPr>
-          <p:cNvSpPr>
-            <a:spLocks noGrp="1" noRot="1" noChangeAspect="1" noMove="1" noResize="1" noEditPoints="1" noAdjustHandles="1" noChangeArrowheads="1" noChangeShapeType="1" noTextEdit="1"/>
-          </p:cNvSpPr>
-          <p:nvPr>
-            <p:extLst>
-              <p:ext uri="{386F3935-93C4-4BCD-93E2-E3B085C9AB24}">
-                <p16:designElem xmlns:p16="http://schemas.microsoft.com/office/powerpoint/2015/main" val="1"/>
-              </p:ext>
-            </p:extLst>
-          </p:nvPr>
-        </p:nvSpPr>
-        <p:spPr>
-          <a:xfrm>
-            <a:off x="0" y="0"/>
-            <a:ext cx="12192000" cy="6858000"/>
-          </a:xfrm>
-          <a:prstGeom prst="rect">
-            <a:avLst/>
-          </a:prstGeom>
-          <a:solidFill>
-            <a:schemeClr val="bg1"/>
-          </a:solidFill>
-          <a:ln>
-            <a:noFill/>
-          </a:ln>
-        </p:spPr>
-        <p:style>
-          <a:lnRef idx="2">
-            <a:schemeClr val="accent1">
-              <a:shade val="50000"/>
-            </a:schemeClr>
-          </a:lnRef>
-          <a:fillRef idx="1">
-            <a:schemeClr val="accent1"/>
-          </a:fillRef>
-          <a:effectRef idx="0">
-            <a:schemeClr val="accent1"/>
-          </a:effectRef>
-          <a:fontRef idx="minor">
-            <a:schemeClr val="lt1"/>
-          </a:fontRef>
-        </p:style>
-        <p:txBody>
-          <a:bodyPr rtlCol="0" anchor="ctr"/>
-          <a:lstStyle/>
-          <a:p>
-            <a:pPr algn="ctr"/>
-            <a:endParaRPr lang="en-US"/>
-          </a:p>
-        </p:txBody>
-      </p:sp>
-      <p:sp>
-        <p:nvSpPr>
-          <p:cNvPr id="25" name="Freeform 23">
-            <a:extLst>
-              <a:ext uri="{FF2B5EF4-FFF2-40B4-BE49-F238E27FC236}">
-                <a16:creationId xmlns:a16="http://schemas.microsoft.com/office/drawing/2014/main" id="{4CE1233C-FD2F-489E-BFDE-086F5FED6491}"/>
-              </a:ext>
-              <a:ext uri="{C183D7F6-B498-43B3-948B-1728B52AA6E4}">
-                <adec:decorative xmlns:adec="http://schemas.microsoft.com/office/drawing/2017/decorative" val="1"/>
-              </a:ext>
-            </a:extLst>
-          </p:cNvPr>
-          <p:cNvSpPr>
-            <a:spLocks noGrp="1" noRot="1" noChangeAspect="1" noMove="1" noResize="1" noEditPoints="1" noAdjustHandles="1" noChangeArrowheads="1" noChangeShapeType="1" noTextEdit="1"/>
-          </p:cNvSpPr>
-          <p:nvPr>
-            <p:extLst>
-              <p:ext uri="{386F3935-93C4-4BCD-93E2-E3B085C9AB24}">
-                <p16:designElem xmlns:p16="http://schemas.microsoft.com/office/powerpoint/2015/main" val="1"/>
-              </p:ext>
-            </p:extLst>
-          </p:nvPr>
-        </p:nvSpPr>
-        <p:spPr bwMode="white">
-          <a:xfrm>
-            <a:off x="0" y="0"/>
-            <a:ext cx="4637005" cy="6858000"/>
-          </a:xfrm>
-          <a:custGeom>
-            <a:avLst/>
-            <a:gdLst>
-              <a:gd name="connsiteX0" fmla="*/ 0 w 4637005"/>
-              <a:gd name="connsiteY0" fmla="*/ 0 h 6858000"/>
-              <a:gd name="connsiteX1" fmla="*/ 4637005 w 4637005"/>
-              <a:gd name="connsiteY1" fmla="*/ 0 h 6858000"/>
-              <a:gd name="connsiteX2" fmla="*/ 4637005 w 4637005"/>
-              <a:gd name="connsiteY2" fmla="*/ 1900238 h 6858000"/>
-              <a:gd name="connsiteX3" fmla="*/ 4266589 w 4637005"/>
-              <a:gd name="connsiteY3" fmla="*/ 2178050 h 6858000"/>
-              <a:gd name="connsiteX4" fmla="*/ 4262355 w 4637005"/>
-              <a:gd name="connsiteY4" fmla="*/ 2184400 h 6858000"/>
-              <a:gd name="connsiteX5" fmla="*/ 4256005 w 4637005"/>
-              <a:gd name="connsiteY5" fmla="*/ 2193925 h 6858000"/>
-              <a:gd name="connsiteX6" fmla="*/ 4249655 w 4637005"/>
-              <a:gd name="connsiteY6" fmla="*/ 2201863 h 6858000"/>
-              <a:gd name="connsiteX7" fmla="*/ 4249655 w 4637005"/>
-              <a:gd name="connsiteY7" fmla="*/ 2211388 h 6858000"/>
-              <a:gd name="connsiteX8" fmla="*/ 4249655 w 4637005"/>
-              <a:gd name="connsiteY8" fmla="*/ 2220913 h 6858000"/>
-              <a:gd name="connsiteX9" fmla="*/ 4256005 w 4637005"/>
-              <a:gd name="connsiteY9" fmla="*/ 2228850 h 6858000"/>
-              <a:gd name="connsiteX10" fmla="*/ 4262355 w 4637005"/>
-              <a:gd name="connsiteY10" fmla="*/ 2238375 h 6858000"/>
-              <a:gd name="connsiteX11" fmla="*/ 4266589 w 4637005"/>
-              <a:gd name="connsiteY11" fmla="*/ 2244725 h 6858000"/>
-              <a:gd name="connsiteX12" fmla="*/ 4637005 w 4637005"/>
-              <a:gd name="connsiteY12" fmla="*/ 2522538 h 6858000"/>
-              <a:gd name="connsiteX13" fmla="*/ 4637005 w 4637005"/>
-              <a:gd name="connsiteY13" fmla="*/ 6858000 h 6858000"/>
-              <a:gd name="connsiteX14" fmla="*/ 0 w 4637005"/>
-              <a:gd name="connsiteY14" fmla="*/ 6858000 h 6858000"/>
-            </a:gdLst>
-            <a:ahLst/>
-            <a:cxnLst>
-              <a:cxn ang="0">
-                <a:pos x="connsiteX0" y="connsiteY0"/>
-              </a:cxn>
-              <a:cxn ang="0">
-                <a:pos x="connsiteX1" y="connsiteY1"/>
-              </a:cxn>
-              <a:cxn ang="0">
-                <a:pos x="connsiteX2" y="connsiteY2"/>
-              </a:cxn>
-              <a:cxn ang="0">
-                <a:pos x="connsiteX3" y="connsiteY3"/>
-              </a:cxn>
-              <a:cxn ang="0">
-                <a:pos x="connsiteX4" y="connsiteY4"/>
-              </a:cxn>
-              <a:cxn ang="0">
-                <a:pos x="connsiteX5" y="connsiteY5"/>
-              </a:cxn>
-              <a:cxn ang="0">
-                <a:pos x="connsiteX6" y="connsiteY6"/>
-              </a:cxn>
-              <a:cxn ang="0">
-                <a:pos x="connsiteX7" y="connsiteY7"/>
-              </a:cxn>
-              <a:cxn ang="0">
-                <a:pos x="connsiteX8" y="connsiteY8"/>
-              </a:cxn>
-              <a:cxn ang="0">
-                <a:pos x="connsiteX9" y="connsiteY9"/>
-              </a:cxn>
-              <a:cxn ang="0">
-                <a:pos x="connsiteX10" y="connsiteY10"/>
-              </a:cxn>
-              <a:cxn ang="0">
-                <a:pos x="connsiteX11" y="connsiteY11"/>
-              </a:cxn>
-              <a:cxn ang="0">
-                <a:pos x="connsiteX12" y="connsiteY12"/>
-              </a:cxn>
-              <a:cxn ang="0">
-                <a:pos x="connsiteX13" y="connsiteY13"/>
-              </a:cxn>
-              <a:cxn ang="0">
-                <a:pos x="connsiteX14" y="connsiteY14"/>
-              </a:cxn>
-            </a:cxnLst>
-            <a:rect l="l" t="t" r="r" b="b"/>
-            <a:pathLst>
-              <a:path w="4637005" h="6858000">
-                <a:moveTo>
-                  <a:pt x="0" y="0"/>
-                </a:moveTo>
-                <a:lnTo>
-                  <a:pt x="4637005" y="0"/>
-                </a:lnTo>
-                <a:lnTo>
-                  <a:pt x="4637005" y="1900238"/>
-                </a:lnTo>
-                <a:lnTo>
-                  <a:pt x="4266589" y="2178050"/>
-                </a:lnTo>
-                <a:lnTo>
-                  <a:pt x="4262355" y="2184400"/>
-                </a:lnTo>
-                <a:lnTo>
-                  <a:pt x="4256005" y="2193925"/>
-                </a:lnTo>
-                <a:lnTo>
-                  <a:pt x="4249655" y="2201863"/>
-                </a:lnTo>
-                <a:lnTo>
-                  <a:pt x="4249655" y="2211388"/>
-                </a:lnTo>
-                <a:lnTo>
-                  <a:pt x="4249655" y="2220913"/>
-                </a:lnTo>
-                <a:lnTo>
-                  <a:pt x="4256005" y="2228850"/>
-                </a:lnTo>
-                <a:lnTo>
-                  <a:pt x="4262355" y="2238375"/>
-                </a:lnTo>
-                <a:lnTo>
-                  <a:pt x="4266589" y="2244725"/>
-                </a:lnTo>
-                <a:lnTo>
-                  <a:pt x="4637005" y="2522538"/>
-                </a:lnTo>
-                <a:lnTo>
-                  <a:pt x="4637005" y="6858000"/>
-                </a:lnTo>
-                <a:lnTo>
-                  <a:pt x="0" y="6858000"/>
-                </a:lnTo>
-                <a:close/>
-              </a:path>
-            </a:pathLst>
-          </a:custGeom>
-          <a:blipFill>
-            <a:blip r:embed="rId2">
-              <a:duotone>
-                <a:schemeClr val="accent1">
-                  <a:tint val="98000"/>
-                  <a:lumMod val="102000"/>
-                </a:schemeClr>
-                <a:schemeClr val="accent1">
-                  <a:shade val="98000"/>
-                  <a:lumMod val="98000"/>
-                </a:schemeClr>
-              </a:duotone>
-            </a:blip>
-            <a:tile tx="0" ty="0" sx="100000" sy="100000" flip="none" algn="tl"/>
-          </a:blipFill>
-          <a:ln>
-            <a:headEnd/>
-            <a:tailEnd/>
-          </a:ln>
-        </p:spPr>
-        <p:style>
-          <a:lnRef idx="1">
-            <a:schemeClr val="accent1"/>
-          </a:lnRef>
-          <a:fillRef idx="3">
-            <a:schemeClr val="accent1"/>
-          </a:fillRef>
-          <a:effectRef idx="2">
-            <a:schemeClr val="accent1"/>
-          </a:effectRef>
-          <a:fontRef idx="minor">
-            <a:schemeClr val="lt1"/>
-          </a:fontRef>
-        </p:style>
-        <p:txBody>
-          <a:bodyPr wrap="square" rtlCol="0" anchor="ctr">
-            <a:noAutofit/>
-          </a:bodyPr>
-          <a:lstStyle/>
-          <a:p>
-            <a:pPr algn="ctr"/>
-            <a:endParaRPr lang="en-US"/>
-          </a:p>
-        </p:txBody>
-      </p:sp>
-      <p:sp>
-        <p:nvSpPr>
-          <p:cNvPr id="2" name="Naslov 1">
-            <a:extLst>
-              <a:ext uri="{FF2B5EF4-FFF2-40B4-BE49-F238E27FC236}">
-                <a16:creationId xmlns:a16="http://schemas.microsoft.com/office/drawing/2014/main" id="{422AF827-5C06-0CB7-4EF9-32408E8EB392}"/>
-              </a:ext>
-            </a:extLst>
-          </p:cNvPr>
-          <p:cNvSpPr>
-            <a:spLocks noGrp="1"/>
-          </p:cNvSpPr>
-          <p:nvPr>
-            <p:ph type="title"/>
-          </p:nvPr>
-        </p:nvSpPr>
-        <p:spPr>
-          <a:xfrm>
-            <a:off x="451514" y="1800225"/>
-            <a:ext cx="3444211" cy="838200"/>
-          </a:xfrm>
-        </p:spPr>
-        <p:txBody>
-          <a:bodyPr vert="horz" lIns="91440" tIns="45720" rIns="91440" bIns="45720" rtlCol="0" anchor="t">
-            <a:normAutofit/>
-          </a:bodyPr>
-          <a:lstStyle/>
-          <a:p>
-            <a:r>
-              <a:rPr lang="en-US" sz="4400" dirty="0"/>
-              <a:t>Main page</a:t>
-            </a:r>
-          </a:p>
-        </p:txBody>
-      </p:sp>
-      <p:pic>
-        <p:nvPicPr>
-          <p:cNvPr id="5" name="Rezervirano mjesto sadržaja 4">
-            <a:extLst>
-              <a:ext uri="{FF2B5EF4-FFF2-40B4-BE49-F238E27FC236}">
-                <a16:creationId xmlns:a16="http://schemas.microsoft.com/office/drawing/2014/main" id="{3D1B5D4E-6C03-83C3-F7A2-FC54B2379F31}"/>
-              </a:ext>
-            </a:extLst>
-          </p:cNvPr>
-          <p:cNvPicPr>
-            <a:picLocks noGrp="1" noChangeAspect="1"/>
-          </p:cNvPicPr>
-          <p:nvPr>
-            <p:ph idx="1"/>
-          </p:nvPr>
-        </p:nvPicPr>
-        <p:blipFill>
-          <a:blip r:embed="rId3">
-            <a:extLst>
-              <a:ext uri="{28A0092B-C50C-407E-A947-70E740481C1C}">
-                <a14:useLocalDpi xmlns:a14="http://schemas.microsoft.com/office/drawing/2010/main" val="0"/>
-              </a:ext>
-            </a:extLst>
-          </a:blip>
-          <a:stretch>
-            <a:fillRect/>
-          </a:stretch>
-        </p:blipFill>
-        <p:spPr>
-          <a:xfrm>
-            <a:off x="5280472" y="1430655"/>
-            <a:ext cx="6268062" cy="3823517"/>
-          </a:xfrm>
-          <a:prstGeom prst="roundRect">
-            <a:avLst>
-              <a:gd name="adj" fmla="val 3876"/>
-            </a:avLst>
-          </a:prstGeom>
-          <a:ln>
-            <a:solidFill>
-              <a:schemeClr val="accent1"/>
-            </a:solidFill>
-          </a:ln>
-          <a:effectLst/>
-        </p:spPr>
-      </p:pic>
-      <p:sp>
-        <p:nvSpPr>
-          <p:cNvPr id="3" name="TekstniOkvir 2">
-            <a:extLst>
-              <a:ext uri="{FF2B5EF4-FFF2-40B4-BE49-F238E27FC236}">
-                <a16:creationId xmlns:a16="http://schemas.microsoft.com/office/drawing/2014/main" id="{A4CC4290-6036-2A56-FB56-5991F8242FD1}"/>
-              </a:ext>
-            </a:extLst>
-          </p:cNvPr>
-          <p:cNvSpPr txBox="1"/>
-          <p:nvPr/>
-        </p:nvSpPr>
-        <p:spPr>
-          <a:xfrm>
-            <a:off x="438150" y="3000375"/>
-            <a:ext cx="3476625" cy="2308324"/>
-          </a:xfrm>
-          <a:prstGeom prst="rect">
-            <a:avLst/>
-          </a:prstGeom>
-          <a:noFill/>
-        </p:spPr>
-        <p:txBody>
-          <a:bodyPr wrap="square" rtlCol="0">
-            <a:spAutoFit/>
-          </a:bodyPr>
-          <a:lstStyle/>
-          <a:p>
-            <a:pPr marL="285750" indent="-285750">
-              <a:buFont typeface="Arial" panose="020B0604020202020204" pitchFamily="34" charset="0"/>
-              <a:buChar char="•"/>
-            </a:pPr>
-            <a:r>
-              <a:rPr lang="en-US" sz="2400" dirty="0">
-                <a:solidFill>
-                  <a:schemeClr val="bg1"/>
-                </a:solidFill>
-              </a:rPr>
-              <a:t>Exploring new events</a:t>
-            </a:r>
-          </a:p>
-          <a:p>
-            <a:pPr marL="285750" indent="-285750">
-              <a:buFont typeface="Arial" panose="020B0604020202020204" pitchFamily="34" charset="0"/>
-              <a:buChar char="•"/>
-            </a:pPr>
-            <a:r>
-              <a:rPr lang="en-US" sz="2400" dirty="0">
-                <a:solidFill>
-                  <a:schemeClr val="bg1"/>
-                </a:solidFill>
-              </a:rPr>
-              <a:t>Basic information about every event</a:t>
-            </a:r>
-          </a:p>
-          <a:p>
-            <a:pPr marL="285750" indent="-285750">
-              <a:buFont typeface="Arial" panose="020B0604020202020204" pitchFamily="34" charset="0"/>
-              <a:buChar char="•"/>
-            </a:pPr>
-            <a:r>
-              <a:rPr lang="en-US" sz="2400" dirty="0">
-                <a:solidFill>
-                  <a:schemeClr val="bg1"/>
-                </a:solidFill>
-              </a:rPr>
-              <a:t>Details for more information</a:t>
-            </a:r>
-            <a:endParaRPr lang="hr-HR" sz="2400" dirty="0">
-              <a:solidFill>
-                <a:schemeClr val="bg1"/>
-              </a:solidFill>
-            </a:endParaRPr>
-          </a:p>
-        </p:txBody>
-      </p:sp>
-    </p:spTree>
-    <p:extLst>
-      <p:ext uri="{BB962C8B-B14F-4D97-AF65-F5344CB8AC3E}">
-        <p14:creationId xmlns:p14="http://schemas.microsoft.com/office/powerpoint/2010/main" val="458643066"/>
-      </p:ext>
-    </p:extLst>
-  </p:cSld>
-  <p:clrMapOvr>
-    <a:overrideClrMapping bg1="lt1" tx1="dk1" bg2="lt2" tx2="dk2" accent1="accent1" accent2="accent2" accent3="accent3" accent4="accent4" accent5="accent5" accent6="accent6" hlink="hlink" folHlink="folHlink"/>
-  </p:clrMapOvr>
-</p:sld>
-</file>
-
-<file path=ppt/slides/slide8.xml><?xml version="1.0" encoding="utf-8"?>
-<p:sld xmlns:a="http://schemas.openxmlformats.org/drawingml/2006/main" xmlns:r="http://schemas.openxmlformats.org/officeDocument/2006/relationships" xmlns:p="http://schemas.openxmlformats.org/presentationml/2006/main">
-  <p:cSld>
-    <p:bg>
-      <p:bgPr>
-        <a:solidFill>
-          <a:schemeClr val="bg2"/>
-        </a:solidFill>
-        <a:effectLst/>
-      </p:bgPr>
-    </p:bg>
-    <p:spTree>
-      <p:nvGrpSpPr>
-        <p:cNvPr id="1" name=""/>
-        <p:cNvGrpSpPr/>
-        <p:nvPr/>
-      </p:nvGrpSpPr>
-      <p:grpSpPr>
-        <a:xfrm>
-          <a:off x="0" y="0"/>
-          <a:ext cx="0" cy="0"/>
-          <a:chOff x="0" y="0"/>
-          <a:chExt cx="0" cy="0"/>
-        </a:xfrm>
-      </p:grpSpPr>
-      <p:sp>
-        <p:nvSpPr>
-          <p:cNvPr id="2" name="Naslov 1">
-            <a:extLst>
-              <a:ext uri="{FF2B5EF4-FFF2-40B4-BE49-F238E27FC236}">
-                <a16:creationId xmlns:a16="http://schemas.microsoft.com/office/drawing/2014/main" id="{768485EA-81BC-4660-3DAE-991DDA2F1511}"/>
-              </a:ext>
-            </a:extLst>
-          </p:cNvPr>
-          <p:cNvSpPr>
-            <a:spLocks noGrp="1"/>
-          </p:cNvSpPr>
-          <p:nvPr>
-            <p:ph type="title"/>
-          </p:nvPr>
-        </p:nvSpPr>
-        <p:spPr>
-          <a:xfrm>
-            <a:off x="810000" y="447188"/>
-            <a:ext cx="10571998" cy="970450"/>
-          </a:xfrm>
-        </p:spPr>
-        <p:txBody>
-          <a:bodyPr vert="horz" lIns="91440" tIns="45720" rIns="91440" bIns="45720" rtlCol="0">
-            <a:normAutofit/>
-          </a:bodyPr>
-          <a:lstStyle/>
-          <a:p>
-            <a:r>
-              <a:rPr lang="en-US"/>
-              <a:t>Creating a new event</a:t>
-            </a:r>
-          </a:p>
-        </p:txBody>
-      </p:sp>
-      <p:sp>
-        <p:nvSpPr>
-          <p:cNvPr id="27" name="Content Placeholder 26">
-            <a:extLst>
-              <a:ext uri="{FF2B5EF4-FFF2-40B4-BE49-F238E27FC236}">
-                <a16:creationId xmlns:a16="http://schemas.microsoft.com/office/drawing/2014/main" id="{2A4D26A3-36A3-9F5E-BC02-522A9F3B4F9C}"/>
-              </a:ext>
-            </a:extLst>
-          </p:cNvPr>
-          <p:cNvSpPr>
-            <a:spLocks noGrp="1"/>
-          </p:cNvSpPr>
-          <p:nvPr>
-            <p:ph idx="1"/>
-          </p:nvPr>
-        </p:nvSpPr>
-        <p:spPr>
-          <a:xfrm>
-            <a:off x="818713" y="2413000"/>
-            <a:ext cx="3835583" cy="3632200"/>
-          </a:xfrm>
-        </p:spPr>
-        <p:txBody>
-          <a:bodyPr>
-            <a:normAutofit/>
-          </a:bodyPr>
-          <a:lstStyle/>
-          <a:p>
-            <a:endParaRPr lang="en-US" sz="1600"/>
-          </a:p>
-        </p:txBody>
-      </p:sp>
-      <p:pic>
-        <p:nvPicPr>
-          <p:cNvPr id="5" name="Rezervirano mjesto sadržaja 4">
-            <a:extLst>
-              <a:ext uri="{FF2B5EF4-FFF2-40B4-BE49-F238E27FC236}">
-                <a16:creationId xmlns:a16="http://schemas.microsoft.com/office/drawing/2014/main" id="{4378B3CA-2420-645E-9B38-0F3813B372D2}"/>
-              </a:ext>
-            </a:extLst>
-          </p:cNvPr>
-          <p:cNvPicPr>
-            <a:picLocks noChangeAspect="1"/>
-          </p:cNvPicPr>
-          <p:nvPr/>
-        </p:nvPicPr>
-        <p:blipFill>
-          <a:blip r:embed="rId2">
-            <a:extLst>
-              <a:ext uri="{28A0092B-C50C-407E-A947-70E740481C1C}">
-                <a14:useLocalDpi xmlns:a14="http://schemas.microsoft.com/office/drawing/2010/main" val="0"/>
-              </a:ext>
-            </a:extLst>
-          </a:blip>
-          <a:stretch>
-            <a:fillRect/>
-          </a:stretch>
-        </p:blipFill>
-        <p:spPr>
-          <a:xfrm>
-            <a:off x="3048866" y="2197980"/>
-            <a:ext cx="6864933" cy="4530856"/>
-          </a:xfrm>
-          <a:prstGeom prst="roundRect">
-            <a:avLst>
-              <a:gd name="adj" fmla="val 3876"/>
-            </a:avLst>
-          </a:prstGeom>
-          <a:ln>
-            <a:solidFill>
-              <a:schemeClr val="accent1"/>
-            </a:solidFill>
-          </a:ln>
-          <a:effectLst/>
-        </p:spPr>
-      </p:pic>
-    </p:spTree>
-    <p:extLst>
-      <p:ext uri="{BB962C8B-B14F-4D97-AF65-F5344CB8AC3E}">
-        <p14:creationId xmlns:p14="http://schemas.microsoft.com/office/powerpoint/2010/main" val="1536467406"/>
-      </p:ext>
-    </p:extLst>
-  </p:cSld>
-  <p:clrMapOvr>
-    <a:masterClrMapping/>
-  </p:clrMapOvr>
-</p:sld>
-</file>
-
-<file path=ppt/slides/slide9.xml><?xml version="1.0" encoding="utf-8"?>
-<p:sld xmlns:a="http://schemas.openxmlformats.org/drawingml/2006/main" xmlns:r="http://schemas.openxmlformats.org/officeDocument/2006/relationships" xmlns:p="http://schemas.openxmlformats.org/presentationml/2006/main">
-  <p:cSld>
-    <p:bg>
-      <p:bgPr>
-        <a:solidFill>
-          <a:schemeClr val="bg1"/>
-        </a:solidFill>
-        <a:effectLst/>
-      </p:bgPr>
-    </p:bg>
-    <p:spTree>
-      <p:nvGrpSpPr>
-        <p:cNvPr id="1" name=""/>
-        <p:cNvGrpSpPr/>
-        <p:nvPr/>
-      </p:nvGrpSpPr>
-      <p:grpSpPr>
-        <a:xfrm>
-          <a:off x="0" y="0"/>
-          <a:ext cx="0" cy="0"/>
-          <a:chOff x="0" y="0"/>
-          <a:chExt cx="0" cy="0"/>
-        </a:xfrm>
-      </p:grpSpPr>
-      <p:sp>
-        <p:nvSpPr>
-          <p:cNvPr id="10" name="Freeform 6">
-            <a:extLst>
-              <a:ext uri="{FF2B5EF4-FFF2-40B4-BE49-F238E27FC236}">
-                <a16:creationId xmlns:a16="http://schemas.microsoft.com/office/drawing/2014/main" id="{133F8CB7-795C-4272-9073-64D8CF97F220}"/>
-              </a:ext>
-              <a:ext uri="{C183D7F6-B498-43B3-948B-1728B52AA6E4}">
-                <adec:decorative xmlns:adec="http://schemas.microsoft.com/office/drawing/2017/decorative" val="1"/>
-              </a:ext>
-            </a:extLst>
-          </p:cNvPr>
-          <p:cNvSpPr>
-            <a:spLocks noGrp="1" noRot="1" noChangeAspect="1" noMove="1" noResize="1" noEditPoints="1" noAdjustHandles="1" noChangeArrowheads="1" noChangeShapeType="1" noTextEdit="1"/>
-          </p:cNvSpPr>
-          <p:nvPr>
-            <p:extLst>
-              <p:ext uri="{386F3935-93C4-4BCD-93E2-E3B085C9AB24}">
-                <p16:designElem xmlns:p16="http://schemas.microsoft.com/office/powerpoint/2015/main" val="1"/>
-              </p:ext>
-            </p:extLst>
-          </p:nvPr>
-        </p:nvSpPr>
-        <p:spPr bwMode="auto">
-          <a:xfrm>
-            <a:off x="0" y="-3175"/>
-            <a:ext cx="12192000" cy="5203825"/>
-          </a:xfrm>
-          <a:custGeom>
-            <a:avLst/>
-            <a:gdLst/>
-            <a:ahLst/>
-            <a:cxnLst/>
-            <a:rect l="0" t="0" r="r" b="b"/>
-            <a:pathLst>
-              <a:path w="5760" h="3278">
-                <a:moveTo>
-                  <a:pt x="5760" y="0"/>
-                </a:moveTo>
-                <a:lnTo>
-                  <a:pt x="0" y="0"/>
-                </a:lnTo>
-                <a:lnTo>
-                  <a:pt x="0" y="3090"/>
-                </a:lnTo>
-                <a:lnTo>
-                  <a:pt x="943" y="3090"/>
-                </a:lnTo>
-                <a:lnTo>
-                  <a:pt x="1123" y="3270"/>
-                </a:lnTo>
-                <a:lnTo>
-                  <a:pt x="1123" y="3270"/>
-                </a:lnTo>
-                <a:lnTo>
-                  <a:pt x="1127" y="3272"/>
-                </a:lnTo>
-                <a:lnTo>
-                  <a:pt x="1133" y="3275"/>
-                </a:lnTo>
-                <a:lnTo>
-                  <a:pt x="1139" y="3278"/>
-                </a:lnTo>
-                <a:lnTo>
-                  <a:pt x="1144" y="3278"/>
-                </a:lnTo>
-                <a:lnTo>
-                  <a:pt x="1150" y="3278"/>
-                </a:lnTo>
-                <a:lnTo>
-                  <a:pt x="1155" y="3275"/>
-                </a:lnTo>
-                <a:lnTo>
-                  <a:pt x="1161" y="3272"/>
-                </a:lnTo>
-                <a:lnTo>
-                  <a:pt x="1165" y="3270"/>
-                </a:lnTo>
-                <a:lnTo>
-                  <a:pt x="1345" y="3090"/>
-                </a:lnTo>
-                <a:lnTo>
-                  <a:pt x="5760" y="3090"/>
-                </a:lnTo>
-                <a:lnTo>
-                  <a:pt x="5760" y="0"/>
-                </a:lnTo>
-                <a:close/>
-              </a:path>
-            </a:pathLst>
-          </a:custGeom>
-          <a:ln/>
-          <a:effectLst/>
-          <a:extLst>
-            <a:ext uri="{91240B29-F687-4f45-9708-019B960494DF}">
-              <a14:hiddenLine xmlns:a14="http://schemas.microsoft.com/office/drawing/2010/main" xmlns:p14="http://schemas.microsoft.com/office/powerpoint/2010/main" xmlns:a16="http://schemas.microsoft.com/office/drawing/2014/main" xmlns="" w="9525">
-                <a:solidFill>
-                  <a:srgbClr val="000000"/>
-                </a:solidFill>
-                <a:round/>
-                <a:headEnd/>
-                <a:tailEnd/>
-              </a14:hiddenLine>
-            </a:ext>
-          </a:extLst>
-        </p:spPr>
-        <p:style>
-          <a:lnRef idx="1">
-            <a:schemeClr val="accent1"/>
-          </a:lnRef>
-          <a:fillRef idx="3">
-            <a:schemeClr val="accent1"/>
-          </a:fillRef>
-          <a:effectRef idx="2">
-            <a:schemeClr val="accent1"/>
-          </a:effectRef>
-          <a:fontRef idx="minor">
-            <a:schemeClr val="lt1"/>
-          </a:fontRef>
-        </p:style>
-      </p:sp>
-      <p:sp>
-        <p:nvSpPr>
-          <p:cNvPr id="12" name="Rectangle 11">
-            <a:extLst>
-              <a:ext uri="{FF2B5EF4-FFF2-40B4-BE49-F238E27FC236}">
-                <a16:creationId xmlns:a16="http://schemas.microsoft.com/office/drawing/2014/main" id="{79277119-B941-4A45-9322-FA2BC135DE62}"/>
-              </a:ext>
-              <a:ext uri="{C183D7F6-B498-43B3-948B-1728B52AA6E4}">
-                <adec:decorative xmlns:adec="http://schemas.microsoft.com/office/drawing/2017/decorative" val="1"/>
-              </a:ext>
-            </a:extLst>
-          </p:cNvPr>
-          <p:cNvSpPr>
-            <a:spLocks noGrp="1" noRot="1" noChangeAspect="1" noMove="1" noResize="1" noEditPoints="1" noAdjustHandles="1" noChangeArrowheads="1" noChangeShapeType="1" noTextEdit="1"/>
-          </p:cNvSpPr>
-          <p:nvPr>
-            <p:extLst>
-              <p:ext uri="{386F3935-93C4-4BCD-93E2-E3B085C9AB24}">
-                <p16:designElem xmlns:p16="http://schemas.microsoft.com/office/powerpoint/2015/main" val="1"/>
-              </p:ext>
-            </p:extLst>
-          </p:nvPr>
-        </p:nvSpPr>
-        <p:spPr>
-          <a:xfrm>
-            <a:off x="0" y="0"/>
-            <a:ext cx="12192000" cy="6858000"/>
-          </a:xfrm>
-          <a:prstGeom prst="rect">
-            <a:avLst/>
-          </a:prstGeom>
-          <a:solidFill>
-            <a:schemeClr val="bg1"/>
-          </a:solidFill>
-          <a:ln>
-            <a:noFill/>
-          </a:ln>
-        </p:spPr>
-        <p:style>
-          <a:lnRef idx="2">
-            <a:schemeClr val="accent1">
-              <a:shade val="50000"/>
-            </a:schemeClr>
-          </a:lnRef>
-          <a:fillRef idx="1">
-            <a:schemeClr val="accent1"/>
-          </a:fillRef>
-          <a:effectRef idx="0">
-            <a:schemeClr val="accent1"/>
-          </a:effectRef>
-          <a:fontRef idx="minor">
-            <a:schemeClr val="lt1"/>
-          </a:fontRef>
-        </p:style>
-        <p:txBody>
-          <a:bodyPr rtlCol="0" anchor="ctr"/>
-          <a:lstStyle/>
-          <a:p>
-            <a:pPr algn="ctr"/>
-            <a:endParaRPr lang="en-US"/>
-          </a:p>
-        </p:txBody>
-      </p:sp>
-      <p:sp>
-        <p:nvSpPr>
-          <p:cNvPr id="14" name="Freeform 23">
-            <a:extLst>
-              <a:ext uri="{FF2B5EF4-FFF2-40B4-BE49-F238E27FC236}">
-                <a16:creationId xmlns:a16="http://schemas.microsoft.com/office/drawing/2014/main" id="{DFDB457D-F372-428B-A10D-41080EF9382A}"/>
-              </a:ext>
-              <a:ext uri="{C183D7F6-B498-43B3-948B-1728B52AA6E4}">
-                <adec:decorative xmlns:adec="http://schemas.microsoft.com/office/drawing/2017/decorative" val="1"/>
-              </a:ext>
-            </a:extLst>
-          </p:cNvPr>
-          <p:cNvSpPr>
-            <a:spLocks noGrp="1" noRot="1" noChangeAspect="1" noMove="1" noResize="1" noEditPoints="1" noAdjustHandles="1" noChangeArrowheads="1" noChangeShapeType="1" noTextEdit="1"/>
-          </p:cNvSpPr>
-          <p:nvPr>
-            <p:extLst>
-              <p:ext uri="{386F3935-93C4-4BCD-93E2-E3B085C9AB24}">
-                <p16:designElem xmlns:p16="http://schemas.microsoft.com/office/powerpoint/2015/main" val="1"/>
-              </p:ext>
-            </p:extLst>
-          </p:nvPr>
-        </p:nvSpPr>
-        <p:spPr bwMode="white">
-          <a:xfrm flipH="1">
-            <a:off x="7554995" y="0"/>
-            <a:ext cx="4637005" cy="6858000"/>
-          </a:xfrm>
-          <a:custGeom>
-            <a:avLst/>
-            <a:gdLst>
-              <a:gd name="connsiteX0" fmla="*/ 0 w 4637005"/>
-              <a:gd name="connsiteY0" fmla="*/ 0 h 6858000"/>
-              <a:gd name="connsiteX1" fmla="*/ 4637005 w 4637005"/>
-              <a:gd name="connsiteY1" fmla="*/ 0 h 6858000"/>
-              <a:gd name="connsiteX2" fmla="*/ 4637005 w 4637005"/>
-              <a:gd name="connsiteY2" fmla="*/ 1900238 h 6858000"/>
-              <a:gd name="connsiteX3" fmla="*/ 4266589 w 4637005"/>
-              <a:gd name="connsiteY3" fmla="*/ 2178050 h 6858000"/>
-              <a:gd name="connsiteX4" fmla="*/ 4262355 w 4637005"/>
-              <a:gd name="connsiteY4" fmla="*/ 2184400 h 6858000"/>
-              <a:gd name="connsiteX5" fmla="*/ 4256005 w 4637005"/>
-              <a:gd name="connsiteY5" fmla="*/ 2193925 h 6858000"/>
-              <a:gd name="connsiteX6" fmla="*/ 4249655 w 4637005"/>
-              <a:gd name="connsiteY6" fmla="*/ 2201863 h 6858000"/>
-              <a:gd name="connsiteX7" fmla="*/ 4249655 w 4637005"/>
-              <a:gd name="connsiteY7" fmla="*/ 2211388 h 6858000"/>
-              <a:gd name="connsiteX8" fmla="*/ 4249655 w 4637005"/>
-              <a:gd name="connsiteY8" fmla="*/ 2220913 h 6858000"/>
-              <a:gd name="connsiteX9" fmla="*/ 4256005 w 4637005"/>
-              <a:gd name="connsiteY9" fmla="*/ 2228850 h 6858000"/>
-              <a:gd name="connsiteX10" fmla="*/ 4262355 w 4637005"/>
-              <a:gd name="connsiteY10" fmla="*/ 2238375 h 6858000"/>
-              <a:gd name="connsiteX11" fmla="*/ 4266589 w 4637005"/>
-              <a:gd name="connsiteY11" fmla="*/ 2244725 h 6858000"/>
-              <a:gd name="connsiteX12" fmla="*/ 4637005 w 4637005"/>
-              <a:gd name="connsiteY12" fmla="*/ 2522538 h 6858000"/>
-              <a:gd name="connsiteX13" fmla="*/ 4637005 w 4637005"/>
-              <a:gd name="connsiteY13" fmla="*/ 6858000 h 6858000"/>
-              <a:gd name="connsiteX14" fmla="*/ 0 w 4637005"/>
-              <a:gd name="connsiteY14" fmla="*/ 6858000 h 6858000"/>
-            </a:gdLst>
-            <a:ahLst/>
-            <a:cxnLst>
-              <a:cxn ang="0">
-                <a:pos x="connsiteX0" y="connsiteY0"/>
-              </a:cxn>
-              <a:cxn ang="0">
-                <a:pos x="connsiteX1" y="connsiteY1"/>
-              </a:cxn>
-              <a:cxn ang="0">
-                <a:pos x="connsiteX2" y="connsiteY2"/>
-              </a:cxn>
-              <a:cxn ang="0">
-                <a:pos x="connsiteX3" y="connsiteY3"/>
-              </a:cxn>
-              <a:cxn ang="0">
-                <a:pos x="connsiteX4" y="connsiteY4"/>
-              </a:cxn>
-              <a:cxn ang="0">
-                <a:pos x="connsiteX5" y="connsiteY5"/>
-              </a:cxn>
-              <a:cxn ang="0">
-                <a:pos x="connsiteX6" y="connsiteY6"/>
-              </a:cxn>
-              <a:cxn ang="0">
-                <a:pos x="connsiteX7" y="connsiteY7"/>
-              </a:cxn>
-              <a:cxn ang="0">
-                <a:pos x="connsiteX8" y="connsiteY8"/>
-              </a:cxn>
-              <a:cxn ang="0">
-                <a:pos x="connsiteX9" y="connsiteY9"/>
-              </a:cxn>
-              <a:cxn ang="0">
-                <a:pos x="connsiteX10" y="connsiteY10"/>
-              </a:cxn>
-              <a:cxn ang="0">
-                <a:pos x="connsiteX11" y="connsiteY11"/>
-              </a:cxn>
-              <a:cxn ang="0">
-                <a:pos x="connsiteX12" y="connsiteY12"/>
-              </a:cxn>
-              <a:cxn ang="0">
-                <a:pos x="connsiteX13" y="connsiteY13"/>
-              </a:cxn>
-              <a:cxn ang="0">
-                <a:pos x="connsiteX14" y="connsiteY14"/>
-              </a:cxn>
-            </a:cxnLst>
-            <a:rect l="l" t="t" r="r" b="b"/>
-            <a:pathLst>
-              <a:path w="4637005" h="6858000">
-                <a:moveTo>
-                  <a:pt x="0" y="0"/>
-                </a:moveTo>
-                <a:lnTo>
-                  <a:pt x="4637005" y="0"/>
-                </a:lnTo>
-                <a:lnTo>
-                  <a:pt x="4637005" y="1900238"/>
-                </a:lnTo>
-                <a:lnTo>
-                  <a:pt x="4266589" y="2178050"/>
-                </a:lnTo>
-                <a:lnTo>
-                  <a:pt x="4262355" y="2184400"/>
-                </a:lnTo>
-                <a:lnTo>
-                  <a:pt x="4256005" y="2193925"/>
-                </a:lnTo>
-                <a:lnTo>
-                  <a:pt x="4249655" y="2201863"/>
-                </a:lnTo>
-                <a:lnTo>
-                  <a:pt x="4249655" y="2211388"/>
-                </a:lnTo>
-                <a:lnTo>
-                  <a:pt x="4249655" y="2220913"/>
-                </a:lnTo>
-                <a:lnTo>
-                  <a:pt x="4256005" y="2228850"/>
-                </a:lnTo>
-                <a:lnTo>
-                  <a:pt x="4262355" y="2238375"/>
-                </a:lnTo>
-                <a:lnTo>
-                  <a:pt x="4266589" y="2244725"/>
-                </a:lnTo>
-                <a:lnTo>
-                  <a:pt x="4637005" y="2522538"/>
-                </a:lnTo>
-                <a:lnTo>
-                  <a:pt x="4637005" y="6858000"/>
-                </a:lnTo>
-                <a:lnTo>
-                  <a:pt x="0" y="6858000"/>
-                </a:lnTo>
-                <a:close/>
-              </a:path>
-            </a:pathLst>
-          </a:custGeom>
-          <a:blipFill>
-            <a:blip r:embed="rId2">
-              <a:duotone>
-                <a:schemeClr val="accent1">
-                  <a:tint val="98000"/>
-                  <a:lumMod val="102000"/>
-                </a:schemeClr>
-                <a:schemeClr val="accent1">
-                  <a:shade val="98000"/>
-                  <a:lumMod val="98000"/>
-                </a:schemeClr>
-              </a:duotone>
-            </a:blip>
-            <a:tile tx="0" ty="0" sx="100000" sy="100000" flip="none" algn="tl"/>
-          </a:blipFill>
-          <a:ln>
-            <a:headEnd/>
-            <a:tailEnd/>
-          </a:ln>
-        </p:spPr>
-        <p:style>
-          <a:lnRef idx="1">
-            <a:schemeClr val="accent1"/>
-          </a:lnRef>
-          <a:fillRef idx="3">
-            <a:schemeClr val="accent1"/>
-          </a:fillRef>
-          <a:effectRef idx="2">
-            <a:schemeClr val="accent1"/>
-          </a:effectRef>
-          <a:fontRef idx="minor">
-            <a:schemeClr val="lt1"/>
-          </a:fontRef>
-        </p:style>
-        <p:txBody>
-          <a:bodyPr wrap="square" rtlCol="0" anchor="ctr">
-            <a:noAutofit/>
-          </a:bodyPr>
-          <a:lstStyle/>
-          <a:p>
-            <a:pPr algn="ctr"/>
-            <a:endParaRPr lang="en-US"/>
-          </a:p>
-        </p:txBody>
-      </p:sp>
-      <p:sp>
-        <p:nvSpPr>
-          <p:cNvPr id="2" name="Naslov 1">
-            <a:extLst>
-              <a:ext uri="{FF2B5EF4-FFF2-40B4-BE49-F238E27FC236}">
-                <a16:creationId xmlns:a16="http://schemas.microsoft.com/office/drawing/2014/main" id="{4AC49F4B-2BAB-7EAD-E28E-CC3C2AAF9346}"/>
-              </a:ext>
-            </a:extLst>
-          </p:cNvPr>
-          <p:cNvSpPr>
-            <a:spLocks noGrp="1"/>
-          </p:cNvSpPr>
-          <p:nvPr>
-            <p:ph type="title"/>
-          </p:nvPr>
-        </p:nvSpPr>
-        <p:spPr>
-          <a:xfrm>
-            <a:off x="8134349" y="1819275"/>
-            <a:ext cx="3606137" cy="776143"/>
-          </a:xfrm>
-        </p:spPr>
-        <p:txBody>
-          <a:bodyPr vert="horz" lIns="91440" tIns="45720" rIns="91440" bIns="45720" rtlCol="0" anchor="t">
-            <a:normAutofit/>
-          </a:bodyPr>
-          <a:lstStyle/>
-          <a:p>
-            <a:r>
-              <a:rPr lang="en-US" sz="4400" dirty="0"/>
-              <a:t>My events</a:t>
-            </a:r>
-          </a:p>
-        </p:txBody>
-      </p:sp>
-      <p:pic>
-        <p:nvPicPr>
-          <p:cNvPr id="5" name="Rezervirano mjesto sadržaja 4">
-            <a:extLst>
-              <a:ext uri="{FF2B5EF4-FFF2-40B4-BE49-F238E27FC236}">
-                <a16:creationId xmlns:a16="http://schemas.microsoft.com/office/drawing/2014/main" id="{B1B3B11A-6C12-9785-AC16-3D7868898CC9}"/>
-              </a:ext>
-            </a:extLst>
-          </p:cNvPr>
-          <p:cNvPicPr>
-            <a:picLocks noGrp="1" noChangeAspect="1"/>
-          </p:cNvPicPr>
-          <p:nvPr>
-            <p:ph idx="1"/>
-          </p:nvPr>
-        </p:nvPicPr>
-        <p:blipFill>
-          <a:blip r:embed="rId3">
-            <a:extLst>
-              <a:ext uri="{28A0092B-C50C-407E-A947-70E740481C1C}">
-                <a14:useLocalDpi xmlns:a14="http://schemas.microsoft.com/office/drawing/2010/main" val="0"/>
-              </a:ext>
-            </a:extLst>
-          </a:blip>
-          <a:stretch>
-            <a:fillRect/>
-          </a:stretch>
-        </p:blipFill>
-        <p:spPr>
-          <a:xfrm>
-            <a:off x="643467" y="1744059"/>
-            <a:ext cx="6268060" cy="3196711"/>
-          </a:xfrm>
-          <a:prstGeom prst="roundRect">
-            <a:avLst>
-              <a:gd name="adj" fmla="val 3876"/>
-            </a:avLst>
-          </a:prstGeom>
-          <a:ln>
-            <a:solidFill>
-              <a:schemeClr val="accent1"/>
-            </a:solidFill>
-          </a:ln>
-          <a:effectLst/>
-        </p:spPr>
-      </p:pic>
-      <p:sp>
-        <p:nvSpPr>
-          <p:cNvPr id="3" name="TekstniOkvir 2">
-            <a:extLst>
-              <a:ext uri="{FF2B5EF4-FFF2-40B4-BE49-F238E27FC236}">
-                <a16:creationId xmlns:a16="http://schemas.microsoft.com/office/drawing/2014/main" id="{82A46A3F-6B72-1626-6A6B-C4C5BA4BC329}"/>
-              </a:ext>
-            </a:extLst>
-          </p:cNvPr>
-          <p:cNvSpPr txBox="1"/>
-          <p:nvPr/>
-        </p:nvSpPr>
-        <p:spPr>
-          <a:xfrm>
-            <a:off x="8183418" y="2918691"/>
-            <a:ext cx="3435927" cy="1815882"/>
-          </a:xfrm>
-          <a:prstGeom prst="rect">
-            <a:avLst/>
-          </a:prstGeom>
-          <a:noFill/>
-        </p:spPr>
-        <p:txBody>
-          <a:bodyPr wrap="square" rtlCol="0">
-            <a:spAutoFit/>
-          </a:bodyPr>
-          <a:lstStyle/>
-          <a:p>
-            <a:pPr marL="285750" indent="-285750">
-              <a:buFont typeface="Arial" panose="020B0604020202020204" pitchFamily="34" charset="0"/>
-              <a:buChar char="•"/>
-            </a:pPr>
-            <a:r>
-              <a:rPr lang="en-US" sz="2800" dirty="0">
-                <a:solidFill>
-                  <a:schemeClr val="bg1"/>
-                </a:solidFill>
-              </a:rPr>
-              <a:t>Current user’s events</a:t>
-            </a:r>
-          </a:p>
-          <a:p>
-            <a:pPr marL="285750" indent="-285750">
-              <a:buFont typeface="Arial" panose="020B0604020202020204" pitchFamily="34" charset="0"/>
-              <a:buChar char="•"/>
-            </a:pPr>
-            <a:r>
-              <a:rPr lang="en-US" sz="2800" dirty="0">
-                <a:solidFill>
-                  <a:schemeClr val="bg1"/>
-                </a:solidFill>
-              </a:rPr>
-              <a:t>Hosting or participating</a:t>
-            </a:r>
-            <a:endParaRPr lang="hr-HR" sz="2800" dirty="0">
-              <a:solidFill>
-                <a:schemeClr val="bg1"/>
-              </a:solidFill>
-            </a:endParaRPr>
-          </a:p>
-        </p:txBody>
-      </p:sp>
-    </p:spTree>
-    <p:extLst>
-      <p:ext uri="{BB962C8B-B14F-4D97-AF65-F5344CB8AC3E}">
-        <p14:creationId xmlns:p14="http://schemas.microsoft.com/office/powerpoint/2010/main" val="665220501"/>
-      </p:ext>
-    </p:extLst>
-  </p:cSld>
-  <p:clrMapOvr>
-    <a:overrideClrMapping bg1="lt1" tx1="dk1" bg2="lt2" tx2="dk2" accent1="accent1" accent2="accent2" accent3="accent3" accent4="accent4" accent5="accent5" accent6="accent6" hlink="hlink" folHlink="folHlink"/>
-  </p:clrMapOvr>
 </p:sld>
 </file>
 

</xml_diff>